<commit_message>
Updated Use Case Graphics Files
Cropped Use Case Graphics
PROBLEM:  Still with cropping of hanging gardens + STAD graphics.
Captured process in cookbook article
Updated the Doc Info file to back off HTML rendering that resulted in the left ToC overlapping the actual document.
</commit_message>
<xml_diff>
--- a/SDPi_Supplement/sources/vol1-diagram-hanging-gardens.pptx
+++ b/SDPi_Supplement/sources/vol1-diagram-hanging-gardens.pptx
@@ -197,7 +197,7 @@
           <a:p>
             <a:fld id="{F1829225-FC3C-C44A-8468-C326742F169D}" type="datetimeFigureOut">
               <a:rPr lang="en-US" smtClean="0"/>
-              <a:t>10/31/2022</a:t>
+              <a:t>11/1/2022</a:t>
             </a:fld>
             <a:endParaRPr lang="en-US"/>
           </a:p>
@@ -695,7 +695,7 @@
           <a:p>
             <a:fld id="{A09E82A5-D8D6-8F4E-B4A9-0CFC3C608A0F}" type="datetimeFigureOut">
               <a:rPr lang="en-US" smtClean="0"/>
-              <a:t>10/31/2022</a:t>
+              <a:t>11/1/2022</a:t>
             </a:fld>
             <a:endParaRPr lang="en-US"/>
           </a:p>
@@ -893,7 +893,7 @@
           <a:p>
             <a:fld id="{A09E82A5-D8D6-8F4E-B4A9-0CFC3C608A0F}" type="datetimeFigureOut">
               <a:rPr lang="en-US" smtClean="0"/>
-              <a:t>10/31/2022</a:t>
+              <a:t>11/1/2022</a:t>
             </a:fld>
             <a:endParaRPr lang="en-US"/>
           </a:p>
@@ -1101,7 +1101,7 @@
           <a:p>
             <a:fld id="{A09E82A5-D8D6-8F4E-B4A9-0CFC3C608A0F}" type="datetimeFigureOut">
               <a:rPr lang="en-US" smtClean="0"/>
-              <a:t>10/31/2022</a:t>
+              <a:t>11/1/2022</a:t>
             </a:fld>
             <a:endParaRPr lang="en-US"/>
           </a:p>
@@ -1299,7 +1299,7 @@
           <a:p>
             <a:fld id="{A09E82A5-D8D6-8F4E-B4A9-0CFC3C608A0F}" type="datetimeFigureOut">
               <a:rPr lang="en-US" smtClean="0"/>
-              <a:t>10/31/2022</a:t>
+              <a:t>11/1/2022</a:t>
             </a:fld>
             <a:endParaRPr lang="en-US"/>
           </a:p>
@@ -1574,7 +1574,7 @@
           <a:p>
             <a:fld id="{A09E82A5-D8D6-8F4E-B4A9-0CFC3C608A0F}" type="datetimeFigureOut">
               <a:rPr lang="en-US" smtClean="0"/>
-              <a:t>10/31/2022</a:t>
+              <a:t>11/1/2022</a:t>
             </a:fld>
             <a:endParaRPr lang="en-US"/>
           </a:p>
@@ -1839,7 +1839,7 @@
           <a:p>
             <a:fld id="{A09E82A5-D8D6-8F4E-B4A9-0CFC3C608A0F}" type="datetimeFigureOut">
               <a:rPr lang="en-US" smtClean="0"/>
-              <a:t>10/31/2022</a:t>
+              <a:t>11/1/2022</a:t>
             </a:fld>
             <a:endParaRPr lang="en-US"/>
           </a:p>
@@ -2251,7 +2251,7 @@
           <a:p>
             <a:fld id="{A09E82A5-D8D6-8F4E-B4A9-0CFC3C608A0F}" type="datetimeFigureOut">
               <a:rPr lang="en-US" smtClean="0"/>
-              <a:t>10/31/2022</a:t>
+              <a:t>11/1/2022</a:t>
             </a:fld>
             <a:endParaRPr lang="en-US"/>
           </a:p>
@@ -2392,7 +2392,7 @@
           <a:p>
             <a:fld id="{A09E82A5-D8D6-8F4E-B4A9-0CFC3C608A0F}" type="datetimeFigureOut">
               <a:rPr lang="en-US" smtClean="0"/>
-              <a:t>10/31/2022</a:t>
+              <a:t>11/1/2022</a:t>
             </a:fld>
             <a:endParaRPr lang="en-US"/>
           </a:p>
@@ -2505,7 +2505,7 @@
           <a:p>
             <a:fld id="{A09E82A5-D8D6-8F4E-B4A9-0CFC3C608A0F}" type="datetimeFigureOut">
               <a:rPr lang="en-US" smtClean="0"/>
-              <a:t>10/31/2022</a:t>
+              <a:t>11/1/2022</a:t>
             </a:fld>
             <a:endParaRPr lang="en-US"/>
           </a:p>
@@ -2816,7 +2816,7 @@
           <a:p>
             <a:fld id="{A09E82A5-D8D6-8F4E-B4A9-0CFC3C608A0F}" type="datetimeFigureOut">
               <a:rPr lang="en-US" smtClean="0"/>
-              <a:t>10/31/2022</a:t>
+              <a:t>11/1/2022</a:t>
             </a:fld>
             <a:endParaRPr lang="en-US"/>
           </a:p>
@@ -3104,7 +3104,7 @@
           <a:p>
             <a:fld id="{A09E82A5-D8D6-8F4E-B4A9-0CFC3C608A0F}" type="datetimeFigureOut">
               <a:rPr lang="en-US" smtClean="0"/>
-              <a:t>10/31/2022</a:t>
+              <a:t>11/1/2022</a:t>
             </a:fld>
             <a:endParaRPr lang="en-US"/>
           </a:p>
@@ -3345,7 +3345,7 @@
           <a:p>
             <a:fld id="{A09E82A5-D8D6-8F4E-B4A9-0CFC3C608A0F}" type="datetimeFigureOut">
               <a:rPr lang="en-US" smtClean="0"/>
-              <a:t>10/31/2022</a:t>
+              <a:t>11/1/2022</a:t>
             </a:fld>
             <a:endParaRPr lang="en-US"/>
           </a:p>
@@ -3746,7 +3746,7 @@
 </file>
 
 <file path=ppt/slides/slide1.xml><?xml version="1.0" encoding="utf-8"?>
-<p:sld xmlns:a="http://schemas.openxmlformats.org/drawingml/2006/main" xmlns:r="http://schemas.openxmlformats.org/officeDocument/2006/relationships" xmlns:p="http://schemas.openxmlformats.org/presentationml/2006/main">
+<p:sld xmlns:a="http://schemas.openxmlformats.org/drawingml/2006/main" xmlns:r="http://schemas.openxmlformats.org/officeDocument/2006/relationships" xmlns:p="http://schemas.openxmlformats.org/presentationml/2006/main" showMasterSp="0">
   <p:cSld>
     <p:spTree>
       <p:nvGrpSpPr>
@@ -3762,1692 +3762,1713 @@
           <a:chExt cx="0" cy="0"/>
         </a:xfrm>
       </p:grpSpPr>
-      <p:sp>
-        <p:nvSpPr>
-          <p:cNvPr id="4" name="Rectangle 3">
-            <a:extLst>
-              <a:ext uri="{FF2B5EF4-FFF2-40B4-BE49-F238E27FC236}">
-                <a16:creationId xmlns:a16="http://schemas.microsoft.com/office/drawing/2014/main" id="{7E0DFF44-0469-0240-8399-542965ACA01D}"/>
-              </a:ext>
-            </a:extLst>
-          </p:cNvPr>
-          <p:cNvSpPr/>
+      <p:grpSp>
+        <p:nvGrpSpPr>
+          <p:cNvPr id="6" name="Group 5">
+            <a:extLst>
+              <a:ext uri="{FF2B5EF4-FFF2-40B4-BE49-F238E27FC236}">
+                <a16:creationId xmlns:a16="http://schemas.microsoft.com/office/drawing/2014/main" id="{66E7774B-B25B-F633-D505-C083E3056966}"/>
+              </a:ext>
+            </a:extLst>
+          </p:cNvPr>
+          <p:cNvGrpSpPr/>
           <p:nvPr/>
-        </p:nvSpPr>
-        <p:spPr>
+        </p:nvGrpSpPr>
+        <p:grpSpPr>
           <a:xfrm>
-            <a:off x="4086969" y="5089154"/>
-            <a:ext cx="2474256" cy="976497"/>
+            <a:off x="1645390" y="986506"/>
+            <a:ext cx="8896196" cy="5455381"/>
+            <a:chOff x="1645390" y="986506"/>
+            <a:chExt cx="8896196" cy="5455381"/>
           </a:xfrm>
-          <a:prstGeom prst="rect">
-            <a:avLst/>
-          </a:prstGeom>
-        </p:spPr>
-        <p:style>
-          <a:lnRef idx="2">
-            <a:schemeClr val="accent1">
-              <a:shade val="50000"/>
-            </a:schemeClr>
-          </a:lnRef>
-          <a:fillRef idx="1">
-            <a:schemeClr val="accent1"/>
-          </a:fillRef>
-          <a:effectRef idx="0">
-            <a:schemeClr val="accent1"/>
-          </a:effectRef>
-          <a:fontRef idx="minor">
-            <a:schemeClr val="lt1"/>
-          </a:fontRef>
-        </p:style>
-        <p:txBody>
-          <a:bodyPr rtlCol="0" anchor="ctr"/>
-          <a:lstStyle/>
-          <a:p>
-            <a:pPr algn="ctr"/>
-            <a:r>
-              <a:rPr lang="en-US" sz="1600" dirty="0"/>
-              <a:t>20702 - MDPWS</a:t>
-            </a:r>
-          </a:p>
-        </p:txBody>
-      </p:sp>
-      <p:sp>
-        <p:nvSpPr>
-          <p:cNvPr id="5" name="Rectangle 4">
-            <a:extLst>
-              <a:ext uri="{FF2B5EF4-FFF2-40B4-BE49-F238E27FC236}">
-                <a16:creationId xmlns:a16="http://schemas.microsoft.com/office/drawing/2014/main" id="{3C2CD428-EC43-D048-B8AC-0595638A7AA8}"/>
-              </a:ext>
-            </a:extLst>
-          </p:cNvPr>
-          <p:cNvSpPr/>
-          <p:nvPr/>
-        </p:nvSpPr>
-        <p:spPr>
-          <a:xfrm>
-            <a:off x="4086970" y="4621013"/>
-            <a:ext cx="3267968" cy="402086"/>
-          </a:xfrm>
-          <a:prstGeom prst="rect">
-            <a:avLst/>
-          </a:prstGeom>
-        </p:spPr>
-        <p:style>
-          <a:lnRef idx="2">
-            <a:schemeClr val="accent1">
-              <a:shade val="50000"/>
-            </a:schemeClr>
-          </a:lnRef>
-          <a:fillRef idx="1">
-            <a:schemeClr val="accent1"/>
-          </a:fillRef>
-          <a:effectRef idx="0">
-            <a:schemeClr val="accent1"/>
-          </a:effectRef>
-          <a:fontRef idx="minor">
-            <a:schemeClr val="lt1"/>
-          </a:fontRef>
-        </p:style>
-        <p:txBody>
-          <a:bodyPr rtlCol="0" anchor="ctr"/>
-          <a:lstStyle/>
-          <a:p>
-            <a:pPr algn="ctr"/>
-            <a:r>
-              <a:rPr lang="en-US" sz="1600" dirty="0"/>
-              <a:t>10207 – DIM and Service Model</a:t>
-            </a:r>
-          </a:p>
-        </p:txBody>
-      </p:sp>
-      <p:sp>
-        <p:nvSpPr>
-          <p:cNvPr id="7" name="Rectangle 6">
-            <a:extLst>
-              <a:ext uri="{FF2B5EF4-FFF2-40B4-BE49-F238E27FC236}">
-                <a16:creationId xmlns:a16="http://schemas.microsoft.com/office/drawing/2014/main" id="{B873F032-6D73-9F48-8959-839D9CFF368B}"/>
-              </a:ext>
-            </a:extLst>
-          </p:cNvPr>
-          <p:cNvSpPr/>
-          <p:nvPr/>
-        </p:nvSpPr>
-        <p:spPr>
-          <a:xfrm>
-            <a:off x="2755213" y="6212127"/>
-            <a:ext cx="5775267" cy="229760"/>
-          </a:xfrm>
-          <a:prstGeom prst="rect">
-            <a:avLst/>
-          </a:prstGeom>
-          <a:noFill/>
-        </p:spPr>
-        <p:style>
-          <a:lnRef idx="2">
-            <a:schemeClr val="accent1">
-              <a:shade val="50000"/>
-            </a:schemeClr>
-          </a:lnRef>
-          <a:fillRef idx="1">
-            <a:schemeClr val="accent1"/>
-          </a:fillRef>
-          <a:effectRef idx="0">
-            <a:schemeClr val="accent1"/>
-          </a:effectRef>
-          <a:fontRef idx="minor">
-            <a:schemeClr val="lt1"/>
-          </a:fontRef>
-        </p:style>
-        <p:txBody>
-          <a:bodyPr rtlCol="0" anchor="ctr"/>
-          <a:lstStyle/>
-          <a:p>
-            <a:pPr algn="ctr"/>
-            <a:r>
-              <a:rPr lang="en-US" sz="1600" dirty="0">
+        </p:grpSpPr>
+        <p:sp>
+          <p:nvSpPr>
+            <p:cNvPr id="4" name="Rectangle 3">
+              <a:extLst>
+                <a:ext uri="{FF2B5EF4-FFF2-40B4-BE49-F238E27FC236}">
+                  <a16:creationId xmlns:a16="http://schemas.microsoft.com/office/drawing/2014/main" id="{7E0DFF44-0469-0240-8399-542965ACA01D}"/>
+                </a:ext>
+              </a:extLst>
+            </p:cNvPr>
+            <p:cNvSpPr/>
+            <p:nvPr/>
+          </p:nvSpPr>
+          <p:spPr>
+            <a:xfrm>
+              <a:off x="4086969" y="5089154"/>
+              <a:ext cx="2474256" cy="976497"/>
+            </a:xfrm>
+            <a:prstGeom prst="rect">
+              <a:avLst/>
+            </a:prstGeom>
+          </p:spPr>
+          <p:style>
+            <a:lnRef idx="2">
+              <a:schemeClr val="accent1">
+                <a:shade val="50000"/>
+              </a:schemeClr>
+            </a:lnRef>
+            <a:fillRef idx="1">
+              <a:schemeClr val="accent1"/>
+            </a:fillRef>
+            <a:effectRef idx="0">
+              <a:schemeClr val="accent1"/>
+            </a:effectRef>
+            <a:fontRef idx="minor">
+              <a:schemeClr val="lt1"/>
+            </a:fontRef>
+          </p:style>
+          <p:txBody>
+            <a:bodyPr rtlCol="0" anchor="ctr"/>
+            <a:lstStyle/>
+            <a:p>
+              <a:pPr algn="ctr"/>
+              <a:r>
+                <a:rPr lang="en-US" sz="1600" dirty="0"/>
+                <a:t>20702 - MDPWS</a:t>
+              </a:r>
+            </a:p>
+          </p:txBody>
+        </p:sp>
+        <p:sp>
+          <p:nvSpPr>
+            <p:cNvPr id="5" name="Rectangle 4">
+              <a:extLst>
+                <a:ext uri="{FF2B5EF4-FFF2-40B4-BE49-F238E27FC236}">
+                  <a16:creationId xmlns:a16="http://schemas.microsoft.com/office/drawing/2014/main" id="{3C2CD428-EC43-D048-B8AC-0595638A7AA8}"/>
+                </a:ext>
+              </a:extLst>
+            </p:cNvPr>
+            <p:cNvSpPr/>
+            <p:nvPr/>
+          </p:nvSpPr>
+          <p:spPr>
+            <a:xfrm>
+              <a:off x="4086970" y="4621013"/>
+              <a:ext cx="3267968" cy="402086"/>
+            </a:xfrm>
+            <a:prstGeom prst="rect">
+              <a:avLst/>
+            </a:prstGeom>
+          </p:spPr>
+          <p:style>
+            <a:lnRef idx="2">
+              <a:schemeClr val="accent1">
+                <a:shade val="50000"/>
+              </a:schemeClr>
+            </a:lnRef>
+            <a:fillRef idx="1">
+              <a:schemeClr val="accent1"/>
+            </a:fillRef>
+            <a:effectRef idx="0">
+              <a:schemeClr val="accent1"/>
+            </a:effectRef>
+            <a:fontRef idx="minor">
+              <a:schemeClr val="lt1"/>
+            </a:fontRef>
+          </p:style>
+          <p:txBody>
+            <a:bodyPr rtlCol="0" anchor="ctr"/>
+            <a:lstStyle/>
+            <a:p>
+              <a:pPr algn="ctr"/>
+              <a:r>
+                <a:rPr lang="en-US" sz="1600" dirty="0"/>
+                <a:t>10207 – DIM and Service Model</a:t>
+              </a:r>
+            </a:p>
+          </p:txBody>
+        </p:sp>
+        <p:sp>
+          <p:nvSpPr>
+            <p:cNvPr id="7" name="Rectangle 6">
+              <a:extLst>
+                <a:ext uri="{FF2B5EF4-FFF2-40B4-BE49-F238E27FC236}">
+                  <a16:creationId xmlns:a16="http://schemas.microsoft.com/office/drawing/2014/main" id="{B873F032-6D73-9F48-8959-839D9CFF368B}"/>
+                </a:ext>
+              </a:extLst>
+            </p:cNvPr>
+            <p:cNvSpPr/>
+            <p:nvPr/>
+          </p:nvSpPr>
+          <p:spPr>
+            <a:xfrm>
+              <a:off x="2755213" y="6212127"/>
+              <a:ext cx="5775267" cy="229760"/>
+            </a:xfrm>
+            <a:prstGeom prst="rect">
+              <a:avLst/>
+            </a:prstGeom>
+            <a:noFill/>
+          </p:spPr>
+          <p:style>
+            <a:lnRef idx="2">
+              <a:schemeClr val="accent1">
+                <a:shade val="50000"/>
+              </a:schemeClr>
+            </a:lnRef>
+            <a:fillRef idx="1">
+              <a:schemeClr val="accent1"/>
+            </a:fillRef>
+            <a:effectRef idx="0">
+              <a:schemeClr val="accent1"/>
+            </a:effectRef>
+            <a:fontRef idx="minor">
+              <a:schemeClr val="lt1"/>
+            </a:fontRef>
+          </p:style>
+          <p:txBody>
+            <a:bodyPr rtlCol="0" anchor="ctr"/>
+            <a:lstStyle/>
+            <a:p>
+              <a:pPr algn="ctr"/>
+              <a:r>
+                <a:rPr lang="en-US" sz="1600" dirty="0">
+                  <a:solidFill>
+                    <a:schemeClr val="tx1"/>
+                  </a:solidFill>
+                </a:rPr>
+                <a:t>Physical Layers (Ethernet, Wi-Fi, BT, etc.)</a:t>
+              </a:r>
+            </a:p>
+          </p:txBody>
+        </p:sp>
+        <p:sp>
+          <p:nvSpPr>
+            <p:cNvPr id="8" name="Rectangle 7">
+              <a:extLst>
+                <a:ext uri="{FF2B5EF4-FFF2-40B4-BE49-F238E27FC236}">
+                  <a16:creationId xmlns:a16="http://schemas.microsoft.com/office/drawing/2014/main" id="{55C8FFC0-5B68-0745-8089-136909D89A18}"/>
+                </a:ext>
+              </a:extLst>
+            </p:cNvPr>
+            <p:cNvSpPr/>
+            <p:nvPr/>
+          </p:nvSpPr>
+          <p:spPr>
+            <a:xfrm>
+              <a:off x="2755212" y="4620866"/>
+              <a:ext cx="1287302" cy="1439043"/>
+            </a:xfrm>
+            <a:prstGeom prst="rect">
+              <a:avLst/>
+            </a:prstGeom>
+          </p:spPr>
+          <p:style>
+            <a:lnRef idx="2">
+              <a:schemeClr val="accent1">
+                <a:shade val="50000"/>
+              </a:schemeClr>
+            </a:lnRef>
+            <a:fillRef idx="1">
+              <a:schemeClr val="accent1"/>
+            </a:fillRef>
+            <a:effectRef idx="0">
+              <a:schemeClr val="accent1"/>
+            </a:effectRef>
+            <a:fontRef idx="minor">
+              <a:schemeClr val="lt1"/>
+            </a:fontRef>
+          </p:style>
+          <p:txBody>
+            <a:bodyPr rtlCol="0" anchor="ctr"/>
+            <a:lstStyle/>
+            <a:p>
+              <a:pPr algn="ctr"/>
+              <a:r>
+                <a:rPr lang="en-US" sz="1600" dirty="0"/>
+                <a:t>20701 – Architecture and Protocol</a:t>
+              </a:r>
+            </a:p>
+          </p:txBody>
+        </p:sp>
+        <p:sp>
+          <p:nvSpPr>
+            <p:cNvPr id="9" name="Rectangle 8">
+              <a:extLst>
+                <a:ext uri="{FF2B5EF4-FFF2-40B4-BE49-F238E27FC236}">
+                  <a16:creationId xmlns:a16="http://schemas.microsoft.com/office/drawing/2014/main" id="{75676382-3ABF-DB4C-B21F-4D302F4BFF15}"/>
+                </a:ext>
+              </a:extLst>
+            </p:cNvPr>
+            <p:cNvSpPr/>
+            <p:nvPr/>
+          </p:nvSpPr>
+          <p:spPr>
+            <a:xfrm>
+              <a:off x="2772763" y="2553441"/>
+              <a:ext cx="5752699" cy="413572"/>
+            </a:xfrm>
+            <a:prstGeom prst="rect">
+              <a:avLst/>
+            </a:prstGeom>
+            <a:solidFill>
+              <a:schemeClr val="accent6">
+                <a:lumMod val="40000"/>
+                <a:lumOff val="60000"/>
+              </a:schemeClr>
+            </a:solidFill>
+          </p:spPr>
+          <p:style>
+            <a:lnRef idx="2">
+              <a:schemeClr val="accent1">
+                <a:shade val="50000"/>
+              </a:schemeClr>
+            </a:lnRef>
+            <a:fillRef idx="1">
+              <a:schemeClr val="accent1"/>
+            </a:fillRef>
+            <a:effectRef idx="0">
+              <a:schemeClr val="accent1"/>
+            </a:effectRef>
+            <a:fontRef idx="minor">
+              <a:schemeClr val="lt1"/>
+            </a:fontRef>
+          </p:style>
+          <p:txBody>
+            <a:bodyPr rtlCol="0" anchor="ctr"/>
+            <a:lstStyle/>
+            <a:p>
+              <a:pPr algn="ctr"/>
+              <a:r>
+                <a:rPr lang="en-US" sz="1600" dirty="0">
+                  <a:solidFill>
+                    <a:schemeClr val="tx1"/>
+                  </a:solidFill>
+                </a:rPr>
+                <a:t>Key Interoperability Properties &amp; Controls (</a:t>
+              </a:r>
+              <a:r>
+                <a:rPr lang="en-US" sz="1600" dirty="0" err="1">
+                  <a:solidFill>
+                    <a:schemeClr val="tx1"/>
+                  </a:solidFill>
+                </a:rPr>
+                <a:t>PRACtical</a:t>
+              </a:r>
+              <a:r>
+                <a:rPr lang="en-US" sz="1600" dirty="0">
+                  <a:solidFill>
+                    <a:schemeClr val="tx1"/>
+                  </a:solidFill>
+                </a:rPr>
+                <a:t> SES)</a:t>
+              </a:r>
+            </a:p>
+          </p:txBody>
+        </p:sp>
+        <p:sp>
+          <p:nvSpPr>
+            <p:cNvPr id="12" name="Rectangle 11">
+              <a:extLst>
+                <a:ext uri="{FF2B5EF4-FFF2-40B4-BE49-F238E27FC236}">
+                  <a16:creationId xmlns:a16="http://schemas.microsoft.com/office/drawing/2014/main" id="{8C25C19F-F010-6345-81D3-0E4C05B9C23B}"/>
+                </a:ext>
+              </a:extLst>
+            </p:cNvPr>
+            <p:cNvSpPr/>
+            <p:nvPr/>
+          </p:nvSpPr>
+          <p:spPr>
+            <a:xfrm>
+              <a:off x="2765043" y="4138894"/>
+              <a:ext cx="4582173" cy="434420"/>
+            </a:xfrm>
+            <a:prstGeom prst="rect">
+              <a:avLst/>
+            </a:prstGeom>
+            <a:solidFill>
+              <a:schemeClr val="accent6"/>
+            </a:solidFill>
+          </p:spPr>
+          <p:style>
+            <a:lnRef idx="2">
+              <a:schemeClr val="accent1">
+                <a:shade val="50000"/>
+              </a:schemeClr>
+            </a:lnRef>
+            <a:fillRef idx="1">
+              <a:schemeClr val="accent1"/>
+            </a:fillRef>
+            <a:effectRef idx="0">
+              <a:schemeClr val="accent1"/>
+            </a:effectRef>
+            <a:fontRef idx="minor">
+              <a:schemeClr val="lt1"/>
+            </a:fontRef>
+          </p:style>
+          <p:txBody>
+            <a:bodyPr rtlCol="0" anchor="ctr"/>
+            <a:lstStyle/>
+            <a:p>
+              <a:pPr algn="ctr"/>
+              <a:r>
+                <a:rPr lang="en-US" sz="1600" dirty="0">
+                  <a:solidFill>
+                    <a:schemeClr val="tx1"/>
+                  </a:solidFill>
+                </a:rPr>
+                <a:t>IEEE 11073-1070x Participant Key Purposes (PKP) </a:t>
+              </a:r>
+            </a:p>
+          </p:txBody>
+        </p:sp>
+        <p:sp>
+          <p:nvSpPr>
+            <p:cNvPr id="14" name="Rectangle 13">
+              <a:extLst>
+                <a:ext uri="{FF2B5EF4-FFF2-40B4-BE49-F238E27FC236}">
+                  <a16:creationId xmlns:a16="http://schemas.microsoft.com/office/drawing/2014/main" id="{13006735-E910-2149-90CE-C058D1270B47}"/>
+                </a:ext>
+              </a:extLst>
+            </p:cNvPr>
+            <p:cNvSpPr/>
+            <p:nvPr/>
+          </p:nvSpPr>
+          <p:spPr>
+            <a:xfrm>
+              <a:off x="2772764" y="3672856"/>
+              <a:ext cx="4584659" cy="413572"/>
+            </a:xfrm>
+            <a:prstGeom prst="rect">
+              <a:avLst/>
+            </a:prstGeom>
+            <a:solidFill>
+              <a:schemeClr val="accent4">
+                <a:lumMod val="40000"/>
+                <a:lumOff val="60000"/>
+              </a:schemeClr>
+            </a:solidFill>
+          </p:spPr>
+          <p:style>
+            <a:lnRef idx="2">
+              <a:schemeClr val="accent1">
+                <a:shade val="50000"/>
+              </a:schemeClr>
+            </a:lnRef>
+            <a:fillRef idx="1">
+              <a:schemeClr val="accent1"/>
+            </a:fillRef>
+            <a:effectRef idx="0">
+              <a:schemeClr val="accent1"/>
+            </a:effectRef>
+            <a:fontRef idx="minor">
+              <a:schemeClr val="lt1"/>
+            </a:fontRef>
+          </p:style>
+          <p:txBody>
+            <a:bodyPr rtlCol="0" anchor="ctr"/>
+            <a:lstStyle/>
+            <a:p>
+              <a:pPr algn="ctr"/>
+              <a:r>
+                <a:rPr lang="en-US" sz="1600" dirty="0">
+                  <a:solidFill>
+                    <a:schemeClr val="tx1"/>
+                  </a:solidFill>
+                </a:rPr>
+                <a:t>IEEE 11073-1072x -10799  SDC Specializations</a:t>
+              </a:r>
+            </a:p>
+          </p:txBody>
+        </p:sp>
+        <p:sp>
+          <p:nvSpPr>
+            <p:cNvPr id="26" name="Rectangle 25">
+              <a:extLst>
+                <a:ext uri="{FF2B5EF4-FFF2-40B4-BE49-F238E27FC236}">
+                  <a16:creationId xmlns:a16="http://schemas.microsoft.com/office/drawing/2014/main" id="{EBE65EE3-5BF6-154A-A8AC-874CAE77B669}"/>
+                </a:ext>
+              </a:extLst>
+            </p:cNvPr>
+            <p:cNvSpPr/>
+            <p:nvPr/>
+          </p:nvSpPr>
+          <p:spPr>
+            <a:xfrm>
+              <a:off x="6595664" y="5089154"/>
+              <a:ext cx="761759" cy="970755"/>
+            </a:xfrm>
+            <a:prstGeom prst="rect">
+              <a:avLst/>
+            </a:prstGeom>
+            <a:noFill/>
+            <a:ln>
+              <a:prstDash val="dash"/>
+            </a:ln>
+          </p:spPr>
+          <p:style>
+            <a:lnRef idx="2">
+              <a:schemeClr val="accent1">
+                <a:shade val="50000"/>
+              </a:schemeClr>
+            </a:lnRef>
+            <a:fillRef idx="1">
+              <a:schemeClr val="accent1"/>
+            </a:fillRef>
+            <a:effectRef idx="0">
+              <a:schemeClr val="accent1"/>
+            </a:effectRef>
+            <a:fontRef idx="minor">
+              <a:schemeClr val="lt1"/>
+            </a:fontRef>
+          </p:style>
+          <p:txBody>
+            <a:bodyPr rtlCol="0" anchor="ctr"/>
+            <a:lstStyle/>
+            <a:p>
+              <a:pPr algn="ctr"/>
+              <a:r>
+                <a:rPr lang="en-US" sz="1200" dirty="0">
+                  <a:solidFill>
+                    <a:schemeClr val="tx1"/>
+                  </a:solidFill>
+                </a:rPr>
+                <a:t>2070x – gRPC/ </a:t>
+              </a:r>
+              <a:r>
+                <a:rPr lang="en-US" sz="1200" dirty="0" err="1">
+                  <a:solidFill>
+                    <a:schemeClr val="tx1"/>
+                  </a:solidFill>
+                </a:rPr>
+                <a:t>Protobuf</a:t>
+              </a:r>
+              <a:r>
+                <a:rPr lang="en-US" sz="1200" dirty="0">
+                  <a:solidFill>
+                    <a:schemeClr val="tx1"/>
+                  </a:solidFill>
+                </a:rPr>
+                <a:t>, REST, IoT, DDS, …</a:t>
+              </a:r>
+            </a:p>
+          </p:txBody>
+        </p:sp>
+        <p:sp>
+          <p:nvSpPr>
+            <p:cNvPr id="32" name="TextBox 31">
+              <a:extLst>
+                <a:ext uri="{FF2B5EF4-FFF2-40B4-BE49-F238E27FC236}">
+                  <a16:creationId xmlns:a16="http://schemas.microsoft.com/office/drawing/2014/main" id="{93783458-C98A-E44C-B87A-C7E440546A33}"/>
+                </a:ext>
+              </a:extLst>
+            </p:cNvPr>
+            <p:cNvSpPr txBox="1"/>
+            <p:nvPr/>
+          </p:nvSpPr>
+          <p:spPr>
+            <a:xfrm>
+              <a:off x="8724813" y="2044508"/>
+              <a:ext cx="1816772" cy="430887"/>
+            </a:xfrm>
+            <a:prstGeom prst="rect">
+              <a:avLst/>
+            </a:prstGeom>
+            <a:noFill/>
+            <a:ln>
+              <a:solidFill>
+                <a:srgbClr val="FFC000"/>
+              </a:solidFill>
+            </a:ln>
+          </p:spPr>
+          <p:txBody>
+            <a:bodyPr wrap="square" rtlCol="0">
+              <a:spAutoFit/>
+            </a:bodyPr>
+            <a:lstStyle/>
+            <a:p>
+              <a:pPr algn="ctr"/>
+              <a:r>
+                <a:rPr lang="en-US" sz="1100" dirty="0"/>
+                <a:t>Sensors / Actuators / Intelligence Bundles</a:t>
+              </a:r>
+            </a:p>
+          </p:txBody>
+        </p:sp>
+        <p:sp>
+          <p:nvSpPr>
+            <p:cNvPr id="35" name="Rectangle 34">
+              <a:extLst>
+                <a:ext uri="{FF2B5EF4-FFF2-40B4-BE49-F238E27FC236}">
+                  <a16:creationId xmlns:a16="http://schemas.microsoft.com/office/drawing/2014/main" id="{B9971C29-DE64-4EB7-B5FD-3643A0682D3B}"/>
+                </a:ext>
+              </a:extLst>
+            </p:cNvPr>
+            <p:cNvSpPr/>
+            <p:nvPr/>
+          </p:nvSpPr>
+          <p:spPr>
+            <a:xfrm>
+              <a:off x="2763700" y="1303772"/>
+              <a:ext cx="5760419" cy="305742"/>
+            </a:xfrm>
+            <a:prstGeom prst="rect">
+              <a:avLst/>
+            </a:prstGeom>
+            <a:solidFill>
+              <a:srgbClr val="00B0F0"/>
+            </a:solidFill>
+          </p:spPr>
+          <p:style>
+            <a:lnRef idx="2">
+              <a:schemeClr val="accent1">
+                <a:shade val="50000"/>
+              </a:schemeClr>
+            </a:lnRef>
+            <a:fillRef idx="1">
+              <a:schemeClr val="accent1"/>
+            </a:fillRef>
+            <a:effectRef idx="0">
+              <a:schemeClr val="accent1"/>
+            </a:effectRef>
+            <a:fontRef idx="minor">
+              <a:schemeClr val="lt1"/>
+            </a:fontRef>
+          </p:style>
+          <p:txBody>
+            <a:bodyPr rtlCol="0" anchor="ctr"/>
+            <a:lstStyle/>
+            <a:p>
+              <a:pPr algn="ctr"/>
+              <a:r>
+                <a:rPr lang="en-US" sz="1600" dirty="0">
+                  <a:solidFill>
+                    <a:schemeClr val="tx1"/>
+                  </a:solidFill>
+                </a:rPr>
+                <a:t>User Narratives / Use Cases / Requirements</a:t>
+              </a:r>
+            </a:p>
+          </p:txBody>
+        </p:sp>
+        <p:sp>
+          <p:nvSpPr>
+            <p:cNvPr id="37" name="Rectangle 36">
+              <a:extLst>
+                <a:ext uri="{FF2B5EF4-FFF2-40B4-BE49-F238E27FC236}">
+                  <a16:creationId xmlns:a16="http://schemas.microsoft.com/office/drawing/2014/main" id="{8749798A-04CB-46C4-AE54-646040D503F8}"/>
+                </a:ext>
+              </a:extLst>
+            </p:cNvPr>
+            <p:cNvSpPr/>
+            <p:nvPr/>
+          </p:nvSpPr>
+          <p:spPr>
+            <a:xfrm>
+              <a:off x="2765042" y="1664494"/>
+              <a:ext cx="5760419" cy="305742"/>
+            </a:xfrm>
+            <a:prstGeom prst="rect">
+              <a:avLst/>
+            </a:prstGeom>
+            <a:solidFill>
+              <a:schemeClr val="accent2">
+                <a:lumMod val="40000"/>
+                <a:lumOff val="60000"/>
+              </a:schemeClr>
+            </a:solidFill>
+          </p:spPr>
+          <p:style>
+            <a:lnRef idx="2">
+              <a:schemeClr val="accent1">
+                <a:shade val="50000"/>
+              </a:schemeClr>
+            </a:lnRef>
+            <a:fillRef idx="1">
+              <a:schemeClr val="accent1"/>
+            </a:fillRef>
+            <a:effectRef idx="0">
+              <a:schemeClr val="accent1"/>
+            </a:effectRef>
+            <a:fontRef idx="minor">
+              <a:schemeClr val="lt1"/>
+            </a:fontRef>
+          </p:style>
+          <p:txBody>
+            <a:bodyPr rtlCol="0" anchor="ctr"/>
+            <a:lstStyle/>
+            <a:p>
+              <a:pPr algn="ctr"/>
+              <a:r>
+                <a:rPr lang="en-US" sz="1600" dirty="0">
+                  <a:solidFill>
+                    <a:schemeClr val="tx1"/>
+                  </a:solidFill>
+                </a:rPr>
+                <a:t>Reference Architectures / Frameworks</a:t>
+              </a:r>
+            </a:p>
+          </p:txBody>
+        </p:sp>
+        <p:sp>
+          <p:nvSpPr>
+            <p:cNvPr id="38" name="Rectangle 37">
+              <a:extLst>
+                <a:ext uri="{FF2B5EF4-FFF2-40B4-BE49-F238E27FC236}">
+                  <a16:creationId xmlns:a16="http://schemas.microsoft.com/office/drawing/2014/main" id="{7AFBA633-B855-48E9-8A46-607D5306A239}"/>
+                </a:ext>
+              </a:extLst>
+            </p:cNvPr>
+            <p:cNvSpPr/>
+            <p:nvPr/>
+          </p:nvSpPr>
+          <p:spPr>
+            <a:xfrm>
+              <a:off x="2765043" y="3044234"/>
+              <a:ext cx="5760420" cy="413572"/>
+            </a:xfrm>
+            <a:prstGeom prst="rect">
+              <a:avLst/>
+            </a:prstGeom>
+            <a:solidFill>
+              <a:schemeClr val="accent5">
+                <a:lumMod val="60000"/>
+                <a:lumOff val="40000"/>
+              </a:schemeClr>
+            </a:solidFill>
+          </p:spPr>
+          <p:style>
+            <a:lnRef idx="2">
+              <a:schemeClr val="accent1">
+                <a:shade val="50000"/>
+              </a:schemeClr>
+            </a:lnRef>
+            <a:fillRef idx="1">
+              <a:schemeClr val="accent1"/>
+            </a:fillRef>
+            <a:effectRef idx="0">
+              <a:schemeClr val="accent1"/>
+            </a:effectRef>
+            <a:fontRef idx="minor">
+              <a:schemeClr val="lt1"/>
+            </a:fontRef>
+          </p:style>
+          <p:txBody>
+            <a:bodyPr rtlCol="0" anchor="ctr"/>
+            <a:lstStyle/>
+            <a:p>
+              <a:pPr algn="ctr"/>
+              <a:r>
+                <a:rPr lang="en-US" sz="1600" dirty="0" err="1">
+                  <a:solidFill>
+                    <a:schemeClr val="tx1"/>
+                  </a:solidFill>
+                </a:rPr>
+                <a:t>SDPi+FHIR</a:t>
+              </a:r>
+              <a:r>
+                <a:rPr lang="en-US" sz="1600" dirty="0">
+                  <a:solidFill>
+                    <a:schemeClr val="tx1"/>
+                  </a:solidFill>
+                </a:rPr>
+                <a:t> Profiles / IGs</a:t>
+              </a:r>
+            </a:p>
+          </p:txBody>
+        </p:sp>
+        <p:sp>
+          <p:nvSpPr>
+            <p:cNvPr id="39" name="Rectangle 38">
+              <a:extLst>
+                <a:ext uri="{FF2B5EF4-FFF2-40B4-BE49-F238E27FC236}">
+                  <a16:creationId xmlns:a16="http://schemas.microsoft.com/office/drawing/2014/main" id="{FBF26086-E674-4C20-AC4B-E855150905BB}"/>
+                </a:ext>
+              </a:extLst>
+            </p:cNvPr>
+            <p:cNvSpPr/>
+            <p:nvPr/>
+          </p:nvSpPr>
+          <p:spPr>
+            <a:xfrm>
+              <a:off x="7506986" y="5334287"/>
+              <a:ext cx="1018477" cy="731364"/>
+            </a:xfrm>
+            <a:prstGeom prst="rect">
+              <a:avLst/>
+            </a:prstGeom>
+            <a:solidFill>
+              <a:schemeClr val="accent1">
+                <a:lumMod val="75000"/>
+              </a:schemeClr>
+            </a:solidFill>
+          </p:spPr>
+          <p:style>
+            <a:lnRef idx="2">
+              <a:schemeClr val="accent1">
+                <a:shade val="50000"/>
+              </a:schemeClr>
+            </a:lnRef>
+            <a:fillRef idx="1">
+              <a:schemeClr val="accent1"/>
+            </a:fillRef>
+            <a:effectRef idx="0">
+              <a:schemeClr val="accent1"/>
+            </a:effectRef>
+            <a:fontRef idx="minor">
+              <a:schemeClr val="lt1"/>
+            </a:fontRef>
+          </p:style>
+          <p:txBody>
+            <a:bodyPr rtlCol="0" anchor="ctr"/>
+            <a:lstStyle/>
+            <a:p>
+              <a:pPr algn="ctr"/>
+              <a:r>
+                <a:rPr lang="en-US" sz="1600" dirty="0"/>
+                <a:t>HL7 FHIR</a:t>
+              </a:r>
+            </a:p>
+          </p:txBody>
+        </p:sp>
+        <p:sp>
+          <p:nvSpPr>
+            <p:cNvPr id="40" name="Rectangle 39">
+              <a:extLst>
+                <a:ext uri="{FF2B5EF4-FFF2-40B4-BE49-F238E27FC236}">
+                  <a16:creationId xmlns:a16="http://schemas.microsoft.com/office/drawing/2014/main" id="{FBAA4ED3-0291-4CAC-AABA-19E9554C7C57}"/>
+                </a:ext>
+              </a:extLst>
+            </p:cNvPr>
+            <p:cNvSpPr/>
+            <p:nvPr/>
+          </p:nvSpPr>
+          <p:spPr>
+            <a:xfrm>
+              <a:off x="7490973" y="4613226"/>
+              <a:ext cx="1034490" cy="654183"/>
+            </a:xfrm>
+            <a:prstGeom prst="rect">
+              <a:avLst/>
+            </a:prstGeom>
+            <a:solidFill>
+              <a:schemeClr val="accent1">
+                <a:lumMod val="75000"/>
+              </a:schemeClr>
+            </a:solidFill>
+          </p:spPr>
+          <p:style>
+            <a:lnRef idx="2">
+              <a:schemeClr val="accent1">
+                <a:shade val="50000"/>
+              </a:schemeClr>
+            </a:lnRef>
+            <a:fillRef idx="1">
+              <a:schemeClr val="accent1"/>
+            </a:fillRef>
+            <a:effectRef idx="0">
+              <a:schemeClr val="accent1"/>
+            </a:effectRef>
+            <a:fontRef idx="minor">
+              <a:schemeClr val="lt1"/>
+            </a:fontRef>
+          </p:style>
+          <p:txBody>
+            <a:bodyPr rtlCol="0" anchor="ctr"/>
+            <a:lstStyle/>
+            <a:p>
+              <a:pPr algn="ctr"/>
+              <a:r>
+                <a:rPr lang="en-US" sz="1600" dirty="0"/>
+                <a:t>Devices on FHIR</a:t>
+              </a:r>
+            </a:p>
+          </p:txBody>
+        </p:sp>
+        <p:sp>
+          <p:nvSpPr>
+            <p:cNvPr id="41" name="Rectangle 40">
+              <a:extLst>
+                <a:ext uri="{FF2B5EF4-FFF2-40B4-BE49-F238E27FC236}">
+                  <a16:creationId xmlns:a16="http://schemas.microsoft.com/office/drawing/2014/main" id="{CEC0CD1A-C2BC-4B7A-894F-5CA7826CFBDD}"/>
+                </a:ext>
+              </a:extLst>
+            </p:cNvPr>
+            <p:cNvSpPr/>
+            <p:nvPr/>
+          </p:nvSpPr>
+          <p:spPr>
+            <a:xfrm>
+              <a:off x="2751302" y="2061823"/>
+              <a:ext cx="5774160" cy="413572"/>
+            </a:xfrm>
+            <a:prstGeom prst="rect">
+              <a:avLst/>
+            </a:prstGeom>
+            <a:solidFill>
+              <a:schemeClr val="accent4">
+                <a:lumMod val="40000"/>
+                <a:lumOff val="60000"/>
+              </a:schemeClr>
+            </a:solidFill>
+          </p:spPr>
+          <p:style>
+            <a:lnRef idx="2">
+              <a:schemeClr val="accent1">
+                <a:shade val="50000"/>
+              </a:schemeClr>
+            </a:lnRef>
+            <a:fillRef idx="1">
+              <a:schemeClr val="accent1"/>
+            </a:fillRef>
+            <a:effectRef idx="0">
+              <a:schemeClr val="accent1"/>
+            </a:effectRef>
+            <a:fontRef idx="minor">
+              <a:schemeClr val="lt1"/>
+            </a:fontRef>
+          </p:style>
+          <p:txBody>
+            <a:bodyPr rtlCol="0" anchor="ctr"/>
+            <a:lstStyle/>
+            <a:p>
+              <a:pPr algn="ctr"/>
+              <a:r>
+                <a:rPr lang="en-US" sz="1600" dirty="0">
+                  <a:solidFill>
+                    <a:schemeClr val="tx1"/>
+                  </a:solidFill>
+                </a:rPr>
+                <a:t>Device / Health Software Specializations</a:t>
+              </a:r>
+            </a:p>
+          </p:txBody>
+        </p:sp>
+        <p:sp>
+          <p:nvSpPr>
+            <p:cNvPr id="42" name="Rectangle 41">
+              <a:extLst>
+                <a:ext uri="{FF2B5EF4-FFF2-40B4-BE49-F238E27FC236}">
+                  <a16:creationId xmlns:a16="http://schemas.microsoft.com/office/drawing/2014/main" id="{FAC806DE-CD67-494A-BFA9-8A5ECA284AD2}"/>
+                </a:ext>
+              </a:extLst>
+            </p:cNvPr>
+            <p:cNvSpPr/>
+            <p:nvPr/>
+          </p:nvSpPr>
+          <p:spPr>
+            <a:xfrm>
+              <a:off x="2381419" y="3613454"/>
+              <a:ext cx="5023971" cy="2525435"/>
+            </a:xfrm>
+            <a:prstGeom prst="rect">
+              <a:avLst/>
+            </a:prstGeom>
+            <a:noFill/>
+            <a:ln>
+              <a:solidFill>
+                <a:srgbClr val="00B0F0"/>
+              </a:solidFill>
+              <a:prstDash val="dash"/>
+            </a:ln>
+          </p:spPr>
+          <p:style>
+            <a:lnRef idx="2">
+              <a:schemeClr val="accent1">
+                <a:shade val="50000"/>
+              </a:schemeClr>
+            </a:lnRef>
+            <a:fillRef idx="1">
+              <a:schemeClr val="accent1"/>
+            </a:fillRef>
+            <a:effectRef idx="0">
+              <a:schemeClr val="accent1"/>
+            </a:effectRef>
+            <a:fontRef idx="minor">
+              <a:schemeClr val="lt1"/>
+            </a:fontRef>
+          </p:style>
+          <p:txBody>
+            <a:bodyPr rtlCol="0" anchor="ctr"/>
+            <a:lstStyle/>
+            <a:p>
+              <a:pPr algn="ctr"/>
+              <a:endParaRPr lang="en-US" sz="1200" dirty="0">
                 <a:solidFill>
                   <a:schemeClr val="tx1"/>
                 </a:solidFill>
-              </a:rPr>
-              <a:t>Physical Layers (Ethernet, Wi-Fi, BT, etc.)</a:t>
-            </a:r>
-          </a:p>
-        </p:txBody>
-      </p:sp>
-      <p:sp>
-        <p:nvSpPr>
-          <p:cNvPr id="8" name="Rectangle 7">
-            <a:extLst>
-              <a:ext uri="{FF2B5EF4-FFF2-40B4-BE49-F238E27FC236}">
-                <a16:creationId xmlns:a16="http://schemas.microsoft.com/office/drawing/2014/main" id="{55C8FFC0-5B68-0745-8089-136909D89A18}"/>
-              </a:ext>
-            </a:extLst>
-          </p:cNvPr>
-          <p:cNvSpPr/>
-          <p:nvPr/>
-        </p:nvSpPr>
-        <p:spPr>
-          <a:xfrm>
-            <a:off x="2755212" y="4620866"/>
-            <a:ext cx="1287302" cy="1439043"/>
-          </a:xfrm>
-          <a:prstGeom prst="rect">
-            <a:avLst/>
-          </a:prstGeom>
-        </p:spPr>
-        <p:style>
-          <a:lnRef idx="2">
-            <a:schemeClr val="accent1">
-              <a:shade val="50000"/>
-            </a:schemeClr>
-          </a:lnRef>
-          <a:fillRef idx="1">
-            <a:schemeClr val="accent1"/>
-          </a:fillRef>
-          <a:effectRef idx="0">
-            <a:schemeClr val="accent1"/>
-          </a:effectRef>
-          <a:fontRef idx="minor">
-            <a:schemeClr val="lt1"/>
-          </a:fontRef>
-        </p:style>
-        <p:txBody>
-          <a:bodyPr rtlCol="0" anchor="ctr"/>
-          <a:lstStyle/>
-          <a:p>
-            <a:pPr algn="ctr"/>
-            <a:r>
-              <a:rPr lang="en-US" sz="1600" dirty="0"/>
-              <a:t>20701 – Architecture and Protocol</a:t>
-            </a:r>
-          </a:p>
-        </p:txBody>
-      </p:sp>
-      <p:sp>
-        <p:nvSpPr>
-          <p:cNvPr id="9" name="Rectangle 8">
-            <a:extLst>
-              <a:ext uri="{FF2B5EF4-FFF2-40B4-BE49-F238E27FC236}">
-                <a16:creationId xmlns:a16="http://schemas.microsoft.com/office/drawing/2014/main" id="{75676382-3ABF-DB4C-B21F-4D302F4BFF15}"/>
-              </a:ext>
-            </a:extLst>
-          </p:cNvPr>
-          <p:cNvSpPr/>
-          <p:nvPr/>
-        </p:nvSpPr>
-        <p:spPr>
-          <a:xfrm>
-            <a:off x="2772763" y="2553441"/>
-            <a:ext cx="5752699" cy="413572"/>
-          </a:xfrm>
-          <a:prstGeom prst="rect">
-            <a:avLst/>
-          </a:prstGeom>
-          <a:solidFill>
-            <a:schemeClr val="accent6">
-              <a:lumMod val="40000"/>
-              <a:lumOff val="60000"/>
-            </a:schemeClr>
-          </a:solidFill>
-        </p:spPr>
-        <p:style>
-          <a:lnRef idx="2">
-            <a:schemeClr val="accent1">
-              <a:shade val="50000"/>
-            </a:schemeClr>
-          </a:lnRef>
-          <a:fillRef idx="1">
-            <a:schemeClr val="accent1"/>
-          </a:fillRef>
-          <a:effectRef idx="0">
-            <a:schemeClr val="accent1"/>
-          </a:effectRef>
-          <a:fontRef idx="minor">
-            <a:schemeClr val="lt1"/>
-          </a:fontRef>
-        </p:style>
-        <p:txBody>
-          <a:bodyPr rtlCol="0" anchor="ctr"/>
-          <a:lstStyle/>
-          <a:p>
-            <a:pPr algn="ctr"/>
-            <a:r>
-              <a:rPr lang="en-US" sz="1600" dirty="0">
+              </a:endParaRPr>
+            </a:p>
+          </p:txBody>
+        </p:sp>
+        <p:sp>
+          <p:nvSpPr>
+            <p:cNvPr id="25" name="TextBox 24">
+              <a:extLst>
+                <a:ext uri="{FF2B5EF4-FFF2-40B4-BE49-F238E27FC236}">
+                  <a16:creationId xmlns:a16="http://schemas.microsoft.com/office/drawing/2014/main" id="{BA88DC67-9AA1-4A31-B358-CC9FD922923F}"/>
+                </a:ext>
+              </a:extLst>
+            </p:cNvPr>
+            <p:cNvSpPr txBox="1"/>
+            <p:nvPr/>
+          </p:nvSpPr>
+          <p:spPr>
+            <a:xfrm rot="16200000">
+              <a:off x="1304697" y="4697475"/>
+              <a:ext cx="2500948" cy="369332"/>
+            </a:xfrm>
+            <a:prstGeom prst="rect">
+              <a:avLst/>
+            </a:prstGeom>
+            <a:noFill/>
+          </p:spPr>
+          <p:txBody>
+            <a:bodyPr wrap="square" rtlCol="0">
+              <a:spAutoFit/>
+            </a:bodyPr>
+            <a:lstStyle/>
+            <a:p>
+              <a:r>
+                <a:rPr lang="en-US" b="1" dirty="0">
+                  <a:solidFill>
+                    <a:srgbClr val="0070C0"/>
+                  </a:solidFill>
+                </a:rPr>
+                <a:t>ISO/IEEE 11073 SDC</a:t>
+              </a:r>
+            </a:p>
+          </p:txBody>
+        </p:sp>
+        <p:cxnSp>
+          <p:nvCxnSpPr>
+            <p:cNvPr id="30" name="Straight Arrow Connector 29">
+              <a:extLst>
+                <a:ext uri="{FF2B5EF4-FFF2-40B4-BE49-F238E27FC236}">
+                  <a16:creationId xmlns:a16="http://schemas.microsoft.com/office/drawing/2014/main" id="{63FDA112-74B7-466E-B5AB-BFA418884A2E}"/>
+                </a:ext>
+              </a:extLst>
+            </p:cNvPr>
+            <p:cNvCxnSpPr>
+              <a:cxnSpLocks/>
+            </p:cNvCxnSpPr>
+            <p:nvPr/>
+          </p:nvCxnSpPr>
+          <p:spPr>
+            <a:xfrm>
+              <a:off x="8008218" y="3526381"/>
+              <a:ext cx="0" cy="1068373"/>
+            </a:xfrm>
+            <a:prstGeom prst="straightConnector1">
+              <a:avLst/>
+            </a:prstGeom>
+            <a:ln>
+              <a:tailEnd type="triangle"/>
+            </a:ln>
+          </p:spPr>
+          <p:style>
+            <a:lnRef idx="1">
+              <a:schemeClr val="accent1"/>
+            </a:lnRef>
+            <a:fillRef idx="0">
+              <a:schemeClr val="accent1"/>
+            </a:fillRef>
+            <a:effectRef idx="0">
+              <a:schemeClr val="accent1"/>
+            </a:effectRef>
+            <a:fontRef idx="minor">
+              <a:schemeClr val="tx1"/>
+            </a:fontRef>
+          </p:style>
+        </p:cxnSp>
+        <p:sp>
+          <p:nvSpPr>
+            <p:cNvPr id="47" name="Right Brace 46">
+              <a:extLst>
+                <a:ext uri="{FF2B5EF4-FFF2-40B4-BE49-F238E27FC236}">
+                  <a16:creationId xmlns:a16="http://schemas.microsoft.com/office/drawing/2014/main" id="{A1554F9E-1878-4400-817E-E893979850FE}"/>
+                </a:ext>
+              </a:extLst>
+            </p:cNvPr>
+            <p:cNvSpPr/>
+            <p:nvPr/>
+          </p:nvSpPr>
+          <p:spPr>
+            <a:xfrm>
+              <a:off x="8579068" y="2566348"/>
+              <a:ext cx="143699" cy="400666"/>
+            </a:xfrm>
+            <a:prstGeom prst="rightBrace">
+              <a:avLst/>
+            </a:prstGeom>
+            <a:noFill/>
+            <a:ln w="19050">
+              <a:solidFill>
+                <a:srgbClr val="70AD47"/>
+              </a:solidFill>
+            </a:ln>
+          </p:spPr>
+          <p:txBody>
+            <a:bodyPr wrap="square" rtlCol="0">
+              <a:spAutoFit/>
+            </a:bodyPr>
+            <a:lstStyle/>
+            <a:p>
+              <a:pPr algn="ctr"/>
+              <a:endParaRPr lang="en-US" sz="1100"/>
+            </a:p>
+          </p:txBody>
+        </p:sp>
+        <p:sp>
+          <p:nvSpPr>
+            <p:cNvPr id="48" name="Right Brace 47">
+              <a:extLst>
+                <a:ext uri="{FF2B5EF4-FFF2-40B4-BE49-F238E27FC236}">
+                  <a16:creationId xmlns:a16="http://schemas.microsoft.com/office/drawing/2014/main" id="{CE77FB4E-8397-4B17-9B42-81ADF77EBF49}"/>
+                </a:ext>
+              </a:extLst>
+            </p:cNvPr>
+            <p:cNvSpPr/>
+            <p:nvPr/>
+          </p:nvSpPr>
+          <p:spPr>
+            <a:xfrm>
+              <a:off x="8530480" y="2112756"/>
+              <a:ext cx="194333" cy="362639"/>
+            </a:xfrm>
+            <a:prstGeom prst="rightBrace">
+              <a:avLst/>
+            </a:prstGeom>
+            <a:noFill/>
+            <a:ln w="19050">
+              <a:solidFill>
+                <a:srgbClr val="FFE699"/>
+              </a:solidFill>
+            </a:ln>
+          </p:spPr>
+          <p:txBody>
+            <a:bodyPr wrap="square" rtlCol="0">
+              <a:spAutoFit/>
+            </a:bodyPr>
+            <a:lstStyle/>
+            <a:p>
+              <a:pPr algn="ctr"/>
+              <a:endParaRPr lang="en-US" sz="1100"/>
+            </a:p>
+          </p:txBody>
+        </p:sp>
+        <p:cxnSp>
+          <p:nvCxnSpPr>
+            <p:cNvPr id="62" name="Straight Arrow Connector 61">
+              <a:extLst>
+                <a:ext uri="{FF2B5EF4-FFF2-40B4-BE49-F238E27FC236}">
+                  <a16:creationId xmlns:a16="http://schemas.microsoft.com/office/drawing/2014/main" id="{DE21824B-A998-4109-B4CA-9E7F78B82F25}"/>
+                </a:ext>
+              </a:extLst>
+            </p:cNvPr>
+            <p:cNvCxnSpPr>
+              <a:cxnSpLocks/>
+            </p:cNvCxnSpPr>
+            <p:nvPr/>
+          </p:nvCxnSpPr>
+          <p:spPr>
+            <a:xfrm rot="16200000" flipH="1">
+              <a:off x="7406814" y="4237893"/>
+              <a:ext cx="360724" cy="323273"/>
+            </a:xfrm>
+            <a:prstGeom prst="bentConnector3">
+              <a:avLst>
+                <a:gd name="adj1" fmla="val 3910"/>
+              </a:avLst>
+            </a:prstGeom>
+            <a:ln>
+              <a:tailEnd type="triangle"/>
+            </a:ln>
+          </p:spPr>
+          <p:style>
+            <a:lnRef idx="1">
+              <a:schemeClr val="accent1"/>
+            </a:lnRef>
+            <a:fillRef idx="0">
+              <a:schemeClr val="accent1"/>
+            </a:fillRef>
+            <a:effectRef idx="0">
+              <a:schemeClr val="accent1"/>
+            </a:effectRef>
+            <a:fontRef idx="minor">
+              <a:schemeClr val="tx1"/>
+            </a:fontRef>
+          </p:style>
+        </p:cxnSp>
+        <p:sp>
+          <p:nvSpPr>
+            <p:cNvPr id="33" name="Rectangle 32">
+              <a:extLst>
+                <a:ext uri="{FF2B5EF4-FFF2-40B4-BE49-F238E27FC236}">
+                  <a16:creationId xmlns:a16="http://schemas.microsoft.com/office/drawing/2014/main" id="{056C2E5A-E260-480E-80EF-8C7DD990DBC8}"/>
+                </a:ext>
+              </a:extLst>
+            </p:cNvPr>
+            <p:cNvSpPr/>
+            <p:nvPr/>
+          </p:nvSpPr>
+          <p:spPr>
+            <a:xfrm rot="16200000">
+              <a:off x="-578959" y="3625398"/>
+              <a:ext cx="4737839" cy="289141"/>
+            </a:xfrm>
+            <a:prstGeom prst="rect">
+              <a:avLst/>
+            </a:prstGeom>
+            <a:solidFill>
+              <a:schemeClr val="accent6"/>
+            </a:solidFill>
+          </p:spPr>
+          <p:style>
+            <a:lnRef idx="2">
+              <a:schemeClr val="accent1">
+                <a:shade val="50000"/>
+              </a:schemeClr>
+            </a:lnRef>
+            <a:fillRef idx="1">
+              <a:schemeClr val="accent1"/>
+            </a:fillRef>
+            <a:effectRef idx="0">
+              <a:schemeClr val="accent1"/>
+            </a:effectRef>
+            <a:fontRef idx="minor">
+              <a:schemeClr val="lt1"/>
+            </a:fontRef>
+          </p:style>
+          <p:txBody>
+            <a:bodyPr rtlCol="0" anchor="ctr"/>
+            <a:lstStyle/>
+            <a:p>
+              <a:pPr algn="ctr"/>
+              <a:r>
+                <a:rPr lang="en-US" sz="1400" dirty="0">
+                  <a:solidFill>
+                    <a:schemeClr val="bg1"/>
+                  </a:solidFill>
+                </a:rPr>
+                <a:t>ISO/IEC JWG7 Safety, Effectiveness &amp; Security Standards</a:t>
+              </a:r>
+            </a:p>
+          </p:txBody>
+        </p:sp>
+        <p:sp>
+          <p:nvSpPr>
+            <p:cNvPr id="34" name="Rectangle 33">
+              <a:extLst>
+                <a:ext uri="{FF2B5EF4-FFF2-40B4-BE49-F238E27FC236}">
+                  <a16:creationId xmlns:a16="http://schemas.microsoft.com/office/drawing/2014/main" id="{048D95D5-9744-4EBA-B9CA-C1C88BEF2ACD}"/>
+                </a:ext>
+              </a:extLst>
+            </p:cNvPr>
+            <p:cNvSpPr/>
+            <p:nvPr/>
+          </p:nvSpPr>
+          <p:spPr>
+            <a:xfrm rot="16200000">
+              <a:off x="-216309" y="3622262"/>
+              <a:ext cx="4731563" cy="289141"/>
+            </a:xfrm>
+            <a:prstGeom prst="rect">
+              <a:avLst/>
+            </a:prstGeom>
+            <a:solidFill>
+              <a:srgbClr val="7030A0"/>
+            </a:solidFill>
+          </p:spPr>
+          <p:style>
+            <a:lnRef idx="2">
+              <a:schemeClr val="accent1">
+                <a:shade val="50000"/>
+              </a:schemeClr>
+            </a:lnRef>
+            <a:fillRef idx="1">
+              <a:schemeClr val="accent1"/>
+            </a:fillRef>
+            <a:effectRef idx="0">
+              <a:schemeClr val="accent1"/>
+            </a:effectRef>
+            <a:fontRef idx="minor">
+              <a:schemeClr val="lt1"/>
+            </a:fontRef>
+          </p:style>
+          <p:txBody>
+            <a:bodyPr rtlCol="0" anchor="ctr"/>
+            <a:lstStyle/>
+            <a:p>
+              <a:pPr algn="ctr"/>
+              <a:r>
+                <a:rPr lang="en-US" sz="1400" dirty="0">
+                  <a:solidFill>
+                    <a:schemeClr val="bg1"/>
+                  </a:solidFill>
+                </a:rPr>
+                <a:t>ISO/IEEE 11073-1010x Nomenclature &amp; 11073-10201 DIM</a:t>
+              </a:r>
+            </a:p>
+          </p:txBody>
+        </p:sp>
+        <p:sp>
+          <p:nvSpPr>
+            <p:cNvPr id="3" name="TextBox 2">
+              <a:extLst>
+                <a:ext uri="{FF2B5EF4-FFF2-40B4-BE49-F238E27FC236}">
+                  <a16:creationId xmlns:a16="http://schemas.microsoft.com/office/drawing/2014/main" id="{50D06CED-D061-F043-AAD7-A17A38F98956}"/>
+                </a:ext>
+              </a:extLst>
+            </p:cNvPr>
+            <p:cNvSpPr txBox="1"/>
+            <p:nvPr/>
+          </p:nvSpPr>
+          <p:spPr>
+            <a:xfrm>
+              <a:off x="8724812" y="4705287"/>
+              <a:ext cx="1547597" cy="261613"/>
+            </a:xfrm>
+            <a:prstGeom prst="rect">
+              <a:avLst/>
+            </a:prstGeom>
+            <a:noFill/>
+            <a:ln>
+              <a:solidFill>
+                <a:srgbClr val="4472C4"/>
+              </a:solidFill>
+            </a:ln>
+          </p:spPr>
+          <p:txBody>
+            <a:bodyPr wrap="square" rtlCol="0">
+              <a:spAutoFit/>
+            </a:bodyPr>
+            <a:lstStyle/>
+            <a:p>
+              <a:pPr algn="ctr"/>
+              <a:r>
+                <a:rPr lang="en-US" sz="1100" dirty="0"/>
+                <a:t>Core Standards</a:t>
+              </a:r>
+            </a:p>
+          </p:txBody>
+        </p:sp>
+        <p:sp>
+          <p:nvSpPr>
+            <p:cNvPr id="43" name="Right Brace 42">
+              <a:extLst>
+                <a:ext uri="{FF2B5EF4-FFF2-40B4-BE49-F238E27FC236}">
+                  <a16:creationId xmlns:a16="http://schemas.microsoft.com/office/drawing/2014/main" id="{89C79962-86CD-4F25-9B07-97FBEC574F44}"/>
+                </a:ext>
+              </a:extLst>
+            </p:cNvPr>
+            <p:cNvSpPr/>
+            <p:nvPr/>
+          </p:nvSpPr>
+          <p:spPr>
+            <a:xfrm>
+              <a:off x="8576097" y="3613455"/>
+              <a:ext cx="143700" cy="2452196"/>
+            </a:xfrm>
+            <a:prstGeom prst="rightBrace">
+              <a:avLst/>
+            </a:prstGeom>
+            <a:noFill/>
+            <a:ln w="19050">
+              <a:solidFill>
+                <a:srgbClr val="4472C4"/>
+              </a:solidFill>
+            </a:ln>
+          </p:spPr>
+          <p:txBody>
+            <a:bodyPr wrap="square" rtlCol="0">
+              <a:spAutoFit/>
+            </a:bodyPr>
+            <a:lstStyle/>
+            <a:p>
+              <a:pPr algn="ctr"/>
+              <a:endParaRPr lang="en-US" sz="1100"/>
+            </a:p>
+          </p:txBody>
+        </p:sp>
+        <p:sp>
+          <p:nvSpPr>
+            <p:cNvPr id="44" name="Rectangle 43">
+              <a:extLst>
+                <a:ext uri="{FF2B5EF4-FFF2-40B4-BE49-F238E27FC236}">
+                  <a16:creationId xmlns:a16="http://schemas.microsoft.com/office/drawing/2014/main" id="{28C0BAB7-88D4-4E5A-B05E-0F8EB344A53F}"/>
+                </a:ext>
+              </a:extLst>
+            </p:cNvPr>
+            <p:cNvSpPr/>
+            <p:nvPr/>
+          </p:nvSpPr>
+          <p:spPr>
+            <a:xfrm>
+              <a:off x="2381419" y="1805225"/>
+              <a:ext cx="6197649" cy="1721156"/>
+            </a:xfrm>
+            <a:prstGeom prst="rect">
+              <a:avLst/>
+            </a:prstGeom>
+            <a:noFill/>
+            <a:ln>
+              <a:solidFill>
+                <a:srgbClr val="00B0F0"/>
+              </a:solidFill>
+              <a:prstDash val="dash"/>
+            </a:ln>
+          </p:spPr>
+          <p:style>
+            <a:lnRef idx="2">
+              <a:schemeClr val="accent1">
+                <a:shade val="50000"/>
+              </a:schemeClr>
+            </a:lnRef>
+            <a:fillRef idx="1">
+              <a:schemeClr val="accent1"/>
+            </a:fillRef>
+            <a:effectRef idx="0">
+              <a:schemeClr val="accent1"/>
+            </a:effectRef>
+            <a:fontRef idx="minor">
+              <a:schemeClr val="lt1"/>
+            </a:fontRef>
+          </p:style>
+          <p:txBody>
+            <a:bodyPr rtlCol="0" anchor="ctr"/>
+            <a:lstStyle/>
+            <a:p>
+              <a:pPr algn="ctr"/>
+              <a:endParaRPr lang="en-US" sz="1200" dirty="0">
                 <a:solidFill>
                   <a:schemeClr val="tx1"/>
                 </a:solidFill>
-              </a:rPr>
-              <a:t>Key Interoperability Properties &amp; Controls (</a:t>
-            </a:r>
-            <a:r>
-              <a:rPr lang="en-US" sz="1600" dirty="0" err="1">
-                <a:solidFill>
-                  <a:schemeClr val="tx1"/>
-                </a:solidFill>
-              </a:rPr>
-              <a:t>PRACtical</a:t>
-            </a:r>
-            <a:r>
-              <a:rPr lang="en-US" sz="1600" dirty="0">
-                <a:solidFill>
-                  <a:schemeClr val="tx1"/>
-                </a:solidFill>
-              </a:rPr>
-              <a:t> SES)</a:t>
-            </a:r>
-          </a:p>
-        </p:txBody>
-      </p:sp>
-      <p:sp>
-        <p:nvSpPr>
-          <p:cNvPr id="12" name="Rectangle 11">
-            <a:extLst>
-              <a:ext uri="{FF2B5EF4-FFF2-40B4-BE49-F238E27FC236}">
-                <a16:creationId xmlns:a16="http://schemas.microsoft.com/office/drawing/2014/main" id="{8C25C19F-F010-6345-81D3-0E4C05B9C23B}"/>
-              </a:ext>
-            </a:extLst>
-          </p:cNvPr>
-          <p:cNvSpPr/>
-          <p:nvPr/>
-        </p:nvSpPr>
-        <p:spPr>
-          <a:xfrm>
-            <a:off x="2765043" y="4138894"/>
-            <a:ext cx="4582173" cy="434420"/>
-          </a:xfrm>
-          <a:prstGeom prst="rect">
-            <a:avLst/>
-          </a:prstGeom>
-          <a:solidFill>
-            <a:schemeClr val="accent6"/>
-          </a:solidFill>
-        </p:spPr>
-        <p:style>
-          <a:lnRef idx="2">
-            <a:schemeClr val="accent1">
-              <a:shade val="50000"/>
-            </a:schemeClr>
-          </a:lnRef>
-          <a:fillRef idx="1">
-            <a:schemeClr val="accent1"/>
-          </a:fillRef>
-          <a:effectRef idx="0">
-            <a:schemeClr val="accent1"/>
-          </a:effectRef>
-          <a:fontRef idx="minor">
-            <a:schemeClr val="lt1"/>
-          </a:fontRef>
-        </p:style>
-        <p:txBody>
-          <a:bodyPr rtlCol="0" anchor="ctr"/>
-          <a:lstStyle/>
-          <a:p>
-            <a:pPr algn="ctr"/>
-            <a:r>
-              <a:rPr lang="en-US" sz="1600" dirty="0">
-                <a:solidFill>
-                  <a:schemeClr val="tx1"/>
-                </a:solidFill>
-              </a:rPr>
-              <a:t>IEEE 11073-1070x Participant Key Purposes (PKP) </a:t>
-            </a:r>
-          </a:p>
-        </p:txBody>
-      </p:sp>
-      <p:sp>
-        <p:nvSpPr>
-          <p:cNvPr id="14" name="Rectangle 13">
-            <a:extLst>
-              <a:ext uri="{FF2B5EF4-FFF2-40B4-BE49-F238E27FC236}">
-                <a16:creationId xmlns:a16="http://schemas.microsoft.com/office/drawing/2014/main" id="{13006735-E910-2149-90CE-C058D1270B47}"/>
-              </a:ext>
-            </a:extLst>
-          </p:cNvPr>
-          <p:cNvSpPr/>
-          <p:nvPr/>
-        </p:nvSpPr>
-        <p:spPr>
-          <a:xfrm>
-            <a:off x="2772764" y="3672856"/>
-            <a:ext cx="4584659" cy="413572"/>
-          </a:xfrm>
-          <a:prstGeom prst="rect">
-            <a:avLst/>
-          </a:prstGeom>
-          <a:solidFill>
-            <a:schemeClr val="accent4">
-              <a:lumMod val="40000"/>
-              <a:lumOff val="60000"/>
-            </a:schemeClr>
-          </a:solidFill>
-        </p:spPr>
-        <p:style>
-          <a:lnRef idx="2">
-            <a:schemeClr val="accent1">
-              <a:shade val="50000"/>
-            </a:schemeClr>
-          </a:lnRef>
-          <a:fillRef idx="1">
-            <a:schemeClr val="accent1"/>
-          </a:fillRef>
-          <a:effectRef idx="0">
-            <a:schemeClr val="accent1"/>
-          </a:effectRef>
-          <a:fontRef idx="minor">
-            <a:schemeClr val="lt1"/>
-          </a:fontRef>
-        </p:style>
-        <p:txBody>
-          <a:bodyPr rtlCol="0" anchor="ctr"/>
-          <a:lstStyle/>
-          <a:p>
-            <a:pPr algn="ctr"/>
-            <a:r>
-              <a:rPr lang="en-US" sz="1600" dirty="0">
-                <a:solidFill>
-                  <a:schemeClr val="tx1"/>
-                </a:solidFill>
-              </a:rPr>
-              <a:t>IEEE 11073-1072x -10799  SDC Specializations</a:t>
-            </a:r>
-          </a:p>
-        </p:txBody>
-      </p:sp>
-      <p:sp>
-        <p:nvSpPr>
-          <p:cNvPr id="26" name="Rectangle 25">
-            <a:extLst>
-              <a:ext uri="{FF2B5EF4-FFF2-40B4-BE49-F238E27FC236}">
-                <a16:creationId xmlns:a16="http://schemas.microsoft.com/office/drawing/2014/main" id="{EBE65EE3-5BF6-154A-A8AC-874CAE77B669}"/>
-              </a:ext>
-            </a:extLst>
-          </p:cNvPr>
-          <p:cNvSpPr/>
-          <p:nvPr/>
-        </p:nvSpPr>
-        <p:spPr>
-          <a:xfrm>
-            <a:off x="6595664" y="5089154"/>
-            <a:ext cx="761759" cy="970755"/>
-          </a:xfrm>
-          <a:prstGeom prst="rect">
-            <a:avLst/>
-          </a:prstGeom>
-          <a:noFill/>
-          <a:ln>
-            <a:prstDash val="dash"/>
-          </a:ln>
-        </p:spPr>
-        <p:style>
-          <a:lnRef idx="2">
-            <a:schemeClr val="accent1">
-              <a:shade val="50000"/>
-            </a:schemeClr>
-          </a:lnRef>
-          <a:fillRef idx="1">
-            <a:schemeClr val="accent1"/>
-          </a:fillRef>
-          <a:effectRef idx="0">
-            <a:schemeClr val="accent1"/>
-          </a:effectRef>
-          <a:fontRef idx="minor">
-            <a:schemeClr val="lt1"/>
-          </a:fontRef>
-        </p:style>
-        <p:txBody>
-          <a:bodyPr rtlCol="0" anchor="ctr"/>
-          <a:lstStyle/>
-          <a:p>
-            <a:pPr algn="ctr"/>
-            <a:r>
-              <a:rPr lang="en-US" sz="1200" dirty="0">
-                <a:solidFill>
-                  <a:schemeClr val="tx1"/>
-                </a:solidFill>
-              </a:rPr>
-              <a:t>2070x – gRPC/ </a:t>
-            </a:r>
-            <a:r>
-              <a:rPr lang="en-US" sz="1200" dirty="0" err="1">
-                <a:solidFill>
-                  <a:schemeClr val="tx1"/>
-                </a:solidFill>
-              </a:rPr>
-              <a:t>Protobuf</a:t>
-            </a:r>
-            <a:r>
-              <a:rPr lang="en-US" sz="1200" dirty="0">
-                <a:solidFill>
-                  <a:schemeClr val="tx1"/>
-                </a:solidFill>
-              </a:rPr>
-              <a:t>, REST, IoT, DDS, …</a:t>
-            </a:r>
-          </a:p>
-        </p:txBody>
-      </p:sp>
-      <p:sp>
-        <p:nvSpPr>
-          <p:cNvPr id="32" name="TextBox 31">
-            <a:extLst>
-              <a:ext uri="{FF2B5EF4-FFF2-40B4-BE49-F238E27FC236}">
-                <a16:creationId xmlns:a16="http://schemas.microsoft.com/office/drawing/2014/main" id="{93783458-C98A-E44C-B87A-C7E440546A33}"/>
-              </a:ext>
-            </a:extLst>
-          </p:cNvPr>
-          <p:cNvSpPr txBox="1"/>
-          <p:nvPr/>
-        </p:nvSpPr>
-        <p:spPr>
-          <a:xfrm>
-            <a:off x="8724813" y="2044508"/>
-            <a:ext cx="1816772" cy="430887"/>
-          </a:xfrm>
-          <a:prstGeom prst="rect">
-            <a:avLst/>
-          </a:prstGeom>
-          <a:noFill/>
-          <a:ln>
+              </a:endParaRPr>
+            </a:p>
+          </p:txBody>
+        </p:sp>
+        <p:sp>
+          <p:nvSpPr>
+            <p:cNvPr id="49" name="TextBox 48">
+              <a:extLst>
+                <a:ext uri="{FF2B5EF4-FFF2-40B4-BE49-F238E27FC236}">
+                  <a16:creationId xmlns:a16="http://schemas.microsoft.com/office/drawing/2014/main" id="{6EAC5B87-61CC-4D96-9190-A6D180D7D8C8}"/>
+                </a:ext>
+              </a:extLst>
+            </p:cNvPr>
+            <p:cNvSpPr txBox="1"/>
+            <p:nvPr/>
+          </p:nvSpPr>
+          <p:spPr>
+            <a:xfrm rot="16200000">
+              <a:off x="1291681" y="2071777"/>
+              <a:ext cx="2539874" cy="369332"/>
+            </a:xfrm>
+            <a:prstGeom prst="rect">
+              <a:avLst/>
+            </a:prstGeom>
+            <a:noFill/>
+          </p:spPr>
+          <p:txBody>
+            <a:bodyPr wrap="square" rtlCol="0">
+              <a:spAutoFit/>
+            </a:bodyPr>
+            <a:lstStyle/>
+            <a:p>
+              <a:r>
+                <a:rPr lang="en-US" b="1" dirty="0">
+                  <a:solidFill>
+                    <a:srgbClr val="0070C0"/>
+                  </a:solidFill>
+                </a:rPr>
+                <a:t>Gemini SES MDI</a:t>
+              </a:r>
+            </a:p>
+          </p:txBody>
+        </p:sp>
+        <p:sp>
+          <p:nvSpPr>
+            <p:cNvPr id="13" name="Right Brace 12">
+              <a:extLst>
+                <a:ext uri="{FF2B5EF4-FFF2-40B4-BE49-F238E27FC236}">
+                  <a16:creationId xmlns:a16="http://schemas.microsoft.com/office/drawing/2014/main" id="{041B15BD-0B4A-4012-880D-80046F3FE3E3}"/>
+                </a:ext>
+              </a:extLst>
+            </p:cNvPr>
+            <p:cNvSpPr/>
+            <p:nvPr/>
+          </p:nvSpPr>
+          <p:spPr>
+            <a:xfrm>
+              <a:off x="8593592" y="3041079"/>
+              <a:ext cx="143699" cy="400666"/>
+            </a:xfrm>
+            <a:prstGeom prst="rightBrace">
+              <a:avLst/>
+            </a:prstGeom>
+            <a:noFill/>
+            <a:ln w="19050">
+              <a:solidFill>
+                <a:srgbClr val="9DC3E6"/>
+              </a:solidFill>
+            </a:ln>
+          </p:spPr>
+          <p:txBody>
+            <a:bodyPr wrap="square" rtlCol="0">
+              <a:spAutoFit/>
+            </a:bodyPr>
+            <a:lstStyle/>
+            <a:p>
+              <a:pPr algn="ctr"/>
+              <a:endParaRPr lang="en-US" sz="1100"/>
+            </a:p>
+          </p:txBody>
+        </p:sp>
+        <p:sp>
+          <p:nvSpPr>
+            <p:cNvPr id="10" name="TextBox 9">
+              <a:extLst>
+                <a:ext uri="{FF2B5EF4-FFF2-40B4-BE49-F238E27FC236}">
+                  <a16:creationId xmlns:a16="http://schemas.microsoft.com/office/drawing/2014/main" id="{EC5E3442-9322-43B7-92C8-469A6B8A0E82}"/>
+                </a:ext>
+              </a:extLst>
+            </p:cNvPr>
+            <p:cNvSpPr txBox="1"/>
+            <p:nvPr/>
+          </p:nvSpPr>
+          <p:spPr>
+            <a:xfrm>
+              <a:off x="8719795" y="3041079"/>
+              <a:ext cx="1821791" cy="430887"/>
+            </a:xfrm>
+            <a:prstGeom prst="rect">
+              <a:avLst/>
+            </a:prstGeom>
             <a:solidFill>
-              <a:srgbClr val="FFC000"/>
+              <a:schemeClr val="bg1"/>
             </a:solidFill>
-          </a:ln>
-        </p:spPr>
-        <p:txBody>
-          <a:bodyPr wrap="square" rtlCol="0">
-            <a:spAutoFit/>
-          </a:bodyPr>
-          <a:lstStyle/>
-          <a:p>
-            <a:pPr algn="ctr"/>
-            <a:r>
-              <a:rPr lang="en-US" sz="1100" dirty="0"/>
-              <a:t>Sensors / Actuators / Intelligence Bundles</a:t>
-            </a:r>
-          </a:p>
-        </p:txBody>
-      </p:sp>
-      <p:sp>
-        <p:nvSpPr>
-          <p:cNvPr id="35" name="Rectangle 34">
-            <a:extLst>
-              <a:ext uri="{FF2B5EF4-FFF2-40B4-BE49-F238E27FC236}">
-                <a16:creationId xmlns:a16="http://schemas.microsoft.com/office/drawing/2014/main" id="{B9971C29-DE64-4EB7-B5FD-3643A0682D3B}"/>
-              </a:ext>
-            </a:extLst>
-          </p:cNvPr>
-          <p:cNvSpPr/>
-          <p:nvPr/>
-        </p:nvSpPr>
-        <p:spPr>
-          <a:xfrm>
-            <a:off x="2763700" y="1303772"/>
-            <a:ext cx="5760419" cy="305742"/>
-          </a:xfrm>
-          <a:prstGeom prst="rect">
-            <a:avLst/>
-          </a:prstGeom>
-          <a:solidFill>
-            <a:srgbClr val="00B0F0"/>
-          </a:solidFill>
-        </p:spPr>
-        <p:style>
-          <a:lnRef idx="2">
-            <a:schemeClr val="accent1">
-              <a:shade val="50000"/>
-            </a:schemeClr>
-          </a:lnRef>
-          <a:fillRef idx="1">
-            <a:schemeClr val="accent1"/>
-          </a:fillRef>
-          <a:effectRef idx="0">
-            <a:schemeClr val="accent1"/>
-          </a:effectRef>
-          <a:fontRef idx="minor">
-            <a:schemeClr val="lt1"/>
-          </a:fontRef>
-        </p:style>
-        <p:txBody>
-          <a:bodyPr rtlCol="0" anchor="ctr"/>
-          <a:lstStyle/>
-          <a:p>
-            <a:pPr algn="ctr"/>
-            <a:r>
-              <a:rPr lang="en-US" sz="1600" dirty="0">
-                <a:solidFill>
-                  <a:schemeClr val="tx1"/>
-                </a:solidFill>
-              </a:rPr>
-              <a:t>User Narratives / Use Cases / Requirements</a:t>
-            </a:r>
-          </a:p>
-        </p:txBody>
-      </p:sp>
-      <p:sp>
-        <p:nvSpPr>
-          <p:cNvPr id="37" name="Rectangle 36">
-            <a:extLst>
-              <a:ext uri="{FF2B5EF4-FFF2-40B4-BE49-F238E27FC236}">
-                <a16:creationId xmlns:a16="http://schemas.microsoft.com/office/drawing/2014/main" id="{8749798A-04CB-46C4-AE54-646040D503F8}"/>
-              </a:ext>
-            </a:extLst>
-          </p:cNvPr>
-          <p:cNvSpPr/>
-          <p:nvPr/>
-        </p:nvSpPr>
-        <p:spPr>
-          <a:xfrm>
-            <a:off x="2765042" y="1664494"/>
-            <a:ext cx="5760419" cy="305742"/>
-          </a:xfrm>
-          <a:prstGeom prst="rect">
-            <a:avLst/>
-          </a:prstGeom>
-          <a:solidFill>
-            <a:schemeClr val="accent2">
-              <a:lumMod val="40000"/>
-              <a:lumOff val="60000"/>
-            </a:schemeClr>
-          </a:solidFill>
-        </p:spPr>
-        <p:style>
-          <a:lnRef idx="2">
-            <a:schemeClr val="accent1">
-              <a:shade val="50000"/>
-            </a:schemeClr>
-          </a:lnRef>
-          <a:fillRef idx="1">
-            <a:schemeClr val="accent1"/>
-          </a:fillRef>
-          <a:effectRef idx="0">
-            <a:schemeClr val="accent1"/>
-          </a:effectRef>
-          <a:fontRef idx="minor">
-            <a:schemeClr val="lt1"/>
-          </a:fontRef>
-        </p:style>
-        <p:txBody>
-          <a:bodyPr rtlCol="0" anchor="ctr"/>
-          <a:lstStyle/>
-          <a:p>
-            <a:pPr algn="ctr"/>
-            <a:r>
-              <a:rPr lang="en-US" sz="1600" dirty="0">
-                <a:solidFill>
-                  <a:schemeClr val="tx1"/>
-                </a:solidFill>
-              </a:rPr>
-              <a:t>Reference Architectures / Frameworks</a:t>
-            </a:r>
-          </a:p>
-        </p:txBody>
-      </p:sp>
-      <p:sp>
-        <p:nvSpPr>
-          <p:cNvPr id="38" name="Rectangle 37">
-            <a:extLst>
-              <a:ext uri="{FF2B5EF4-FFF2-40B4-BE49-F238E27FC236}">
-                <a16:creationId xmlns:a16="http://schemas.microsoft.com/office/drawing/2014/main" id="{7AFBA633-B855-48E9-8A46-607D5306A239}"/>
-              </a:ext>
-            </a:extLst>
-          </p:cNvPr>
-          <p:cNvSpPr/>
-          <p:nvPr/>
-        </p:nvSpPr>
-        <p:spPr>
-          <a:xfrm>
-            <a:off x="2765043" y="3044234"/>
-            <a:ext cx="5760420" cy="413572"/>
-          </a:xfrm>
-          <a:prstGeom prst="rect">
-            <a:avLst/>
-          </a:prstGeom>
-          <a:solidFill>
-            <a:schemeClr val="accent5">
-              <a:lumMod val="60000"/>
-              <a:lumOff val="40000"/>
-            </a:schemeClr>
-          </a:solidFill>
-        </p:spPr>
-        <p:style>
-          <a:lnRef idx="2">
-            <a:schemeClr val="accent1">
-              <a:shade val="50000"/>
-            </a:schemeClr>
-          </a:lnRef>
-          <a:fillRef idx="1">
-            <a:schemeClr val="accent1"/>
-          </a:fillRef>
-          <a:effectRef idx="0">
-            <a:schemeClr val="accent1"/>
-          </a:effectRef>
-          <a:fontRef idx="minor">
-            <a:schemeClr val="lt1"/>
-          </a:fontRef>
-        </p:style>
-        <p:txBody>
-          <a:bodyPr rtlCol="0" anchor="ctr"/>
-          <a:lstStyle/>
-          <a:p>
-            <a:pPr algn="ctr"/>
-            <a:r>
-              <a:rPr lang="en-US" sz="1600" dirty="0" err="1">
-                <a:solidFill>
-                  <a:schemeClr val="tx1"/>
-                </a:solidFill>
-              </a:rPr>
-              <a:t>SDPi+FHIR</a:t>
-            </a:r>
-            <a:r>
-              <a:rPr lang="en-US" sz="1600" dirty="0">
-                <a:solidFill>
-                  <a:schemeClr val="tx1"/>
-                </a:solidFill>
-              </a:rPr>
-              <a:t> Profiles / IGs</a:t>
-            </a:r>
-          </a:p>
-        </p:txBody>
-      </p:sp>
-      <p:sp>
-        <p:nvSpPr>
-          <p:cNvPr id="39" name="Rectangle 38">
-            <a:extLst>
-              <a:ext uri="{FF2B5EF4-FFF2-40B4-BE49-F238E27FC236}">
-                <a16:creationId xmlns:a16="http://schemas.microsoft.com/office/drawing/2014/main" id="{FBF26086-E674-4C20-AC4B-E855150905BB}"/>
-              </a:ext>
-            </a:extLst>
-          </p:cNvPr>
-          <p:cNvSpPr/>
-          <p:nvPr/>
-        </p:nvSpPr>
-        <p:spPr>
-          <a:xfrm>
-            <a:off x="7506986" y="5334287"/>
-            <a:ext cx="1018477" cy="731364"/>
-          </a:xfrm>
-          <a:prstGeom prst="rect">
-            <a:avLst/>
-          </a:prstGeom>
-          <a:solidFill>
-            <a:schemeClr val="accent1">
-              <a:lumMod val="75000"/>
-            </a:schemeClr>
-          </a:solidFill>
-        </p:spPr>
-        <p:style>
-          <a:lnRef idx="2">
-            <a:schemeClr val="accent1">
-              <a:shade val="50000"/>
-            </a:schemeClr>
-          </a:lnRef>
-          <a:fillRef idx="1">
-            <a:schemeClr val="accent1"/>
-          </a:fillRef>
-          <a:effectRef idx="0">
-            <a:schemeClr val="accent1"/>
-          </a:effectRef>
-          <a:fontRef idx="minor">
-            <a:schemeClr val="lt1"/>
-          </a:fontRef>
-        </p:style>
-        <p:txBody>
-          <a:bodyPr rtlCol="0" anchor="ctr"/>
-          <a:lstStyle/>
-          <a:p>
-            <a:pPr algn="ctr"/>
-            <a:r>
-              <a:rPr lang="en-US" sz="1600" dirty="0"/>
-              <a:t>HL7 FHIR</a:t>
-            </a:r>
-          </a:p>
-        </p:txBody>
-      </p:sp>
-      <p:sp>
-        <p:nvSpPr>
-          <p:cNvPr id="40" name="Rectangle 39">
-            <a:extLst>
-              <a:ext uri="{FF2B5EF4-FFF2-40B4-BE49-F238E27FC236}">
-                <a16:creationId xmlns:a16="http://schemas.microsoft.com/office/drawing/2014/main" id="{FBAA4ED3-0291-4CAC-AABA-19E9554C7C57}"/>
-              </a:ext>
-            </a:extLst>
-          </p:cNvPr>
-          <p:cNvSpPr/>
-          <p:nvPr/>
-        </p:nvSpPr>
-        <p:spPr>
-          <a:xfrm>
-            <a:off x="7490973" y="4613226"/>
-            <a:ext cx="1034490" cy="654183"/>
-          </a:xfrm>
-          <a:prstGeom prst="rect">
-            <a:avLst/>
-          </a:prstGeom>
-          <a:solidFill>
-            <a:schemeClr val="accent1">
-              <a:lumMod val="75000"/>
-            </a:schemeClr>
-          </a:solidFill>
-        </p:spPr>
-        <p:style>
-          <a:lnRef idx="2">
-            <a:schemeClr val="accent1">
-              <a:shade val="50000"/>
-            </a:schemeClr>
-          </a:lnRef>
-          <a:fillRef idx="1">
-            <a:schemeClr val="accent1"/>
-          </a:fillRef>
-          <a:effectRef idx="0">
-            <a:schemeClr val="accent1"/>
-          </a:effectRef>
-          <a:fontRef idx="minor">
-            <a:schemeClr val="lt1"/>
-          </a:fontRef>
-        </p:style>
-        <p:txBody>
-          <a:bodyPr rtlCol="0" anchor="ctr"/>
-          <a:lstStyle/>
-          <a:p>
-            <a:pPr algn="ctr"/>
-            <a:r>
-              <a:rPr lang="en-US" sz="1600" dirty="0"/>
-              <a:t>Devices on FHIR</a:t>
-            </a:r>
-          </a:p>
-        </p:txBody>
-      </p:sp>
-      <p:sp>
-        <p:nvSpPr>
-          <p:cNvPr id="41" name="Rectangle 40">
-            <a:extLst>
-              <a:ext uri="{FF2B5EF4-FFF2-40B4-BE49-F238E27FC236}">
-                <a16:creationId xmlns:a16="http://schemas.microsoft.com/office/drawing/2014/main" id="{CEC0CD1A-C2BC-4B7A-894F-5CA7826CFBDD}"/>
-              </a:ext>
-            </a:extLst>
-          </p:cNvPr>
-          <p:cNvSpPr/>
-          <p:nvPr/>
-        </p:nvSpPr>
-        <p:spPr>
-          <a:xfrm>
-            <a:off x="2751302" y="2061823"/>
-            <a:ext cx="5774160" cy="413572"/>
-          </a:xfrm>
-          <a:prstGeom prst="rect">
-            <a:avLst/>
-          </a:prstGeom>
-          <a:solidFill>
-            <a:schemeClr val="accent4">
-              <a:lumMod val="40000"/>
-              <a:lumOff val="60000"/>
-            </a:schemeClr>
-          </a:solidFill>
-        </p:spPr>
-        <p:style>
-          <a:lnRef idx="2">
-            <a:schemeClr val="accent1">
-              <a:shade val="50000"/>
-            </a:schemeClr>
-          </a:lnRef>
-          <a:fillRef idx="1">
-            <a:schemeClr val="accent1"/>
-          </a:fillRef>
-          <a:effectRef idx="0">
-            <a:schemeClr val="accent1"/>
-          </a:effectRef>
-          <a:fontRef idx="minor">
-            <a:schemeClr val="lt1"/>
-          </a:fontRef>
-        </p:style>
-        <p:txBody>
-          <a:bodyPr rtlCol="0" anchor="ctr"/>
-          <a:lstStyle/>
-          <a:p>
-            <a:pPr algn="ctr"/>
-            <a:r>
-              <a:rPr lang="en-US" sz="1600" dirty="0">
-                <a:solidFill>
-                  <a:schemeClr val="tx1"/>
-                </a:solidFill>
-              </a:rPr>
-              <a:t>Device / Health Software Specializations</a:t>
-            </a:r>
-          </a:p>
-        </p:txBody>
-      </p:sp>
-      <p:sp>
-        <p:nvSpPr>
-          <p:cNvPr id="42" name="Rectangle 41">
-            <a:extLst>
-              <a:ext uri="{FF2B5EF4-FFF2-40B4-BE49-F238E27FC236}">
-                <a16:creationId xmlns:a16="http://schemas.microsoft.com/office/drawing/2014/main" id="{FAC806DE-CD67-494A-BFA9-8A5ECA284AD2}"/>
-              </a:ext>
-            </a:extLst>
-          </p:cNvPr>
-          <p:cNvSpPr/>
-          <p:nvPr/>
-        </p:nvSpPr>
-        <p:spPr>
-          <a:xfrm>
-            <a:off x="2381419" y="3613454"/>
-            <a:ext cx="5023971" cy="2525435"/>
-          </a:xfrm>
-          <a:prstGeom prst="rect">
-            <a:avLst/>
-          </a:prstGeom>
-          <a:noFill/>
-          <a:ln>
+            <a:ln>
+              <a:solidFill>
+                <a:srgbClr val="9DC3E6"/>
+              </a:solidFill>
+            </a:ln>
+          </p:spPr>
+          <p:txBody>
+            <a:bodyPr wrap="square" rtlCol="0">
+              <a:spAutoFit/>
+            </a:bodyPr>
+            <a:lstStyle/>
+            <a:p>
+              <a:pPr algn="ctr"/>
+              <a:r>
+                <a:rPr lang="en-US" sz="1100" dirty="0"/>
+                <a:t>Stakeholder Community Implementation Agreements</a:t>
+              </a:r>
+            </a:p>
+          </p:txBody>
+        </p:sp>
+        <p:sp>
+          <p:nvSpPr>
+            <p:cNvPr id="31" name="TextBox 30">
+              <a:extLst>
+                <a:ext uri="{FF2B5EF4-FFF2-40B4-BE49-F238E27FC236}">
+                  <a16:creationId xmlns:a16="http://schemas.microsoft.com/office/drawing/2014/main" id="{AD50D505-74C7-6A4E-AA79-3DDA0EBD1BA4}"/>
+                </a:ext>
+              </a:extLst>
+            </p:cNvPr>
+            <p:cNvSpPr txBox="1"/>
+            <p:nvPr/>
+          </p:nvSpPr>
+          <p:spPr>
+            <a:xfrm>
+              <a:off x="8719795" y="2543643"/>
+              <a:ext cx="1821790" cy="430887"/>
+            </a:xfrm>
+            <a:prstGeom prst="rect">
+              <a:avLst/>
+            </a:prstGeom>
             <a:solidFill>
-              <a:srgbClr val="00B0F0"/>
+              <a:schemeClr val="bg1"/>
             </a:solidFill>
-            <a:prstDash val="dash"/>
-          </a:ln>
-        </p:spPr>
-        <p:style>
-          <a:lnRef idx="2">
-            <a:schemeClr val="accent1">
-              <a:shade val="50000"/>
-            </a:schemeClr>
-          </a:lnRef>
-          <a:fillRef idx="1">
-            <a:schemeClr val="accent1"/>
-          </a:fillRef>
-          <a:effectRef idx="0">
-            <a:schemeClr val="accent1"/>
-          </a:effectRef>
-          <a:fontRef idx="minor">
-            <a:schemeClr val="lt1"/>
-          </a:fontRef>
-        </p:style>
-        <p:txBody>
-          <a:bodyPr rtlCol="0" anchor="ctr"/>
-          <a:lstStyle/>
-          <a:p>
-            <a:pPr algn="ctr"/>
-            <a:endParaRPr lang="en-US" sz="1200" dirty="0">
+            <a:ln>
               <a:solidFill>
-                <a:schemeClr val="tx1"/>
+                <a:srgbClr val="70AD47"/>
               </a:solidFill>
-            </a:endParaRPr>
-          </a:p>
-        </p:txBody>
-      </p:sp>
-      <p:sp>
-        <p:nvSpPr>
-          <p:cNvPr id="25" name="TextBox 24">
-            <a:extLst>
-              <a:ext uri="{FF2B5EF4-FFF2-40B4-BE49-F238E27FC236}">
-                <a16:creationId xmlns:a16="http://schemas.microsoft.com/office/drawing/2014/main" id="{BA88DC67-9AA1-4A31-B358-CC9FD922923F}"/>
-              </a:ext>
-            </a:extLst>
-          </p:cNvPr>
-          <p:cNvSpPr txBox="1"/>
-          <p:nvPr/>
-        </p:nvSpPr>
-        <p:spPr>
-          <a:xfrm rot="16200000">
-            <a:off x="1304697" y="4697475"/>
-            <a:ext cx="2500948" cy="369332"/>
-          </a:xfrm>
-          <a:prstGeom prst="rect">
-            <a:avLst/>
-          </a:prstGeom>
-          <a:noFill/>
-        </p:spPr>
-        <p:txBody>
-          <a:bodyPr wrap="square" rtlCol="0">
-            <a:spAutoFit/>
-          </a:bodyPr>
-          <a:lstStyle/>
-          <a:p>
-            <a:r>
-              <a:rPr lang="en-US" b="1" dirty="0">
-                <a:solidFill>
-                  <a:srgbClr val="0070C0"/>
-                </a:solidFill>
-              </a:rPr>
-              <a:t>ISO/IEEE 11073 SDC</a:t>
-            </a:r>
-          </a:p>
-        </p:txBody>
-      </p:sp>
-      <p:cxnSp>
-        <p:nvCxnSpPr>
-          <p:cNvPr id="30" name="Straight Arrow Connector 29">
-            <a:extLst>
-              <a:ext uri="{FF2B5EF4-FFF2-40B4-BE49-F238E27FC236}">
-                <a16:creationId xmlns:a16="http://schemas.microsoft.com/office/drawing/2014/main" id="{63FDA112-74B7-466E-B5AB-BFA418884A2E}"/>
-              </a:ext>
-            </a:extLst>
-          </p:cNvPr>
-          <p:cNvCxnSpPr>
-            <a:cxnSpLocks/>
-          </p:cNvCxnSpPr>
-          <p:nvPr/>
-        </p:nvCxnSpPr>
-        <p:spPr>
-          <a:xfrm>
-            <a:off x="8008218" y="3526381"/>
-            <a:ext cx="0" cy="1068373"/>
-          </a:xfrm>
-          <a:prstGeom prst="straightConnector1">
-            <a:avLst/>
-          </a:prstGeom>
-          <a:ln>
-            <a:tailEnd type="triangle"/>
-          </a:ln>
-        </p:spPr>
-        <p:style>
-          <a:lnRef idx="1">
-            <a:schemeClr val="accent1"/>
-          </a:lnRef>
-          <a:fillRef idx="0">
-            <a:schemeClr val="accent1"/>
-          </a:fillRef>
-          <a:effectRef idx="0">
-            <a:schemeClr val="accent1"/>
-          </a:effectRef>
-          <a:fontRef idx="minor">
-            <a:schemeClr val="tx1"/>
-          </a:fontRef>
-        </p:style>
-      </p:cxnSp>
-      <p:sp>
-        <p:nvSpPr>
-          <p:cNvPr id="47" name="Right Brace 46">
-            <a:extLst>
-              <a:ext uri="{FF2B5EF4-FFF2-40B4-BE49-F238E27FC236}">
-                <a16:creationId xmlns:a16="http://schemas.microsoft.com/office/drawing/2014/main" id="{A1554F9E-1878-4400-817E-E893979850FE}"/>
-              </a:ext>
-            </a:extLst>
-          </p:cNvPr>
-          <p:cNvSpPr/>
-          <p:nvPr/>
-        </p:nvSpPr>
-        <p:spPr>
-          <a:xfrm>
-            <a:off x="8579068" y="2566348"/>
-            <a:ext cx="143699" cy="400666"/>
-          </a:xfrm>
-          <a:prstGeom prst="rightBrace">
-            <a:avLst/>
-          </a:prstGeom>
-          <a:noFill/>
-          <a:ln w="19050">
+            </a:ln>
+          </p:spPr>
+          <p:txBody>
+            <a:bodyPr wrap="square" rtlCol="0">
+              <a:spAutoFit/>
+            </a:bodyPr>
+            <a:lstStyle/>
+            <a:p>
+              <a:pPr algn="ctr"/>
+              <a:r>
+                <a:rPr lang="en-US" sz="1100" dirty="0"/>
+                <a:t>Safe, Effective &amp; Secure Interoperability</a:t>
+              </a:r>
+            </a:p>
+          </p:txBody>
+        </p:sp>
+        <p:sp>
+          <p:nvSpPr>
+            <p:cNvPr id="15" name="TextBox 14">
+              <a:extLst>
+                <a:ext uri="{FF2B5EF4-FFF2-40B4-BE49-F238E27FC236}">
+                  <a16:creationId xmlns:a16="http://schemas.microsoft.com/office/drawing/2014/main" id="{F614D6B2-558D-4702-80EA-A17715646E96}"/>
+                </a:ext>
+              </a:extLst>
+            </p:cNvPr>
+            <p:cNvSpPr txBox="1"/>
+            <p:nvPr/>
+          </p:nvSpPr>
+          <p:spPr>
+            <a:xfrm>
+              <a:off x="8717417" y="1691975"/>
+              <a:ext cx="1816772" cy="261610"/>
+            </a:xfrm>
+            <a:prstGeom prst="rect">
+              <a:avLst/>
+            </a:prstGeom>
             <a:solidFill>
-              <a:srgbClr val="70AD47"/>
+              <a:schemeClr val="bg1"/>
             </a:solidFill>
-          </a:ln>
-        </p:spPr>
-        <p:txBody>
-          <a:bodyPr wrap="square" rtlCol="0">
-            <a:spAutoFit/>
-          </a:bodyPr>
-          <a:lstStyle/>
-          <a:p>
-            <a:pPr algn="ctr"/>
-            <a:endParaRPr lang="en-US" sz="1100"/>
-          </a:p>
-        </p:txBody>
-      </p:sp>
-      <p:sp>
-        <p:nvSpPr>
-          <p:cNvPr id="48" name="Right Brace 47">
-            <a:extLst>
-              <a:ext uri="{FF2B5EF4-FFF2-40B4-BE49-F238E27FC236}">
-                <a16:creationId xmlns:a16="http://schemas.microsoft.com/office/drawing/2014/main" id="{CE77FB4E-8397-4B17-9B42-81ADF77EBF49}"/>
-              </a:ext>
-            </a:extLst>
-          </p:cNvPr>
-          <p:cNvSpPr/>
-          <p:nvPr/>
-        </p:nvSpPr>
-        <p:spPr>
-          <a:xfrm>
-            <a:off x="8530480" y="2112756"/>
-            <a:ext cx="194333" cy="362639"/>
-          </a:xfrm>
-          <a:prstGeom prst="rightBrace">
-            <a:avLst/>
-          </a:prstGeom>
-          <a:noFill/>
-          <a:ln w="19050">
+            <a:ln>
+              <a:solidFill>
+                <a:srgbClr val="F8CBAD"/>
+              </a:solidFill>
+            </a:ln>
+          </p:spPr>
+          <p:txBody>
+            <a:bodyPr wrap="square" rtlCol="0">
+              <a:spAutoFit/>
+            </a:bodyPr>
+            <a:lstStyle/>
+            <a:p>
+              <a:pPr algn="ctr"/>
+              <a:r>
+                <a:rPr lang="en-US" sz="1100" dirty="0"/>
+                <a:t>SOA, MDIRA/ICE, …</a:t>
+              </a:r>
+            </a:p>
+          </p:txBody>
+        </p:sp>
+        <p:sp>
+          <p:nvSpPr>
+            <p:cNvPr id="16" name="Right Brace 15">
+              <a:extLst>
+                <a:ext uri="{FF2B5EF4-FFF2-40B4-BE49-F238E27FC236}">
+                  <a16:creationId xmlns:a16="http://schemas.microsoft.com/office/drawing/2014/main" id="{98057135-CDB9-46E4-B44E-4BB536E2A161}"/>
+                </a:ext>
+              </a:extLst>
+            </p:cNvPr>
+            <p:cNvSpPr/>
+            <p:nvPr/>
+          </p:nvSpPr>
+          <p:spPr>
+            <a:xfrm>
+              <a:off x="8593591" y="1707061"/>
+              <a:ext cx="109099" cy="246523"/>
+            </a:xfrm>
+            <a:prstGeom prst="rightBrace">
+              <a:avLst>
+                <a:gd name="adj1" fmla="val 8333"/>
+                <a:gd name="adj2" fmla="val 51821"/>
+              </a:avLst>
+            </a:prstGeom>
+            <a:noFill/>
+            <a:ln w="19050">
+              <a:solidFill>
+                <a:srgbClr val="F8CBAD"/>
+              </a:solidFill>
+            </a:ln>
+          </p:spPr>
+          <p:txBody>
+            <a:bodyPr wrap="square" rtlCol="0">
+              <a:spAutoFit/>
+            </a:bodyPr>
+            <a:lstStyle/>
+            <a:p>
+              <a:pPr algn="ctr"/>
+              <a:endParaRPr lang="en-US" sz="1100"/>
+            </a:p>
+          </p:txBody>
+        </p:sp>
+        <p:sp>
+          <p:nvSpPr>
+            <p:cNvPr id="18" name="Right Brace 17">
+              <a:extLst>
+                <a:ext uri="{FF2B5EF4-FFF2-40B4-BE49-F238E27FC236}">
+                  <a16:creationId xmlns:a16="http://schemas.microsoft.com/office/drawing/2014/main" id="{46F43B94-BBD8-4D2F-AE2D-D4A7459E3E86}"/>
+                </a:ext>
+              </a:extLst>
+            </p:cNvPr>
+            <p:cNvSpPr/>
+            <p:nvPr/>
+          </p:nvSpPr>
+          <p:spPr>
+            <a:xfrm>
+              <a:off x="8533242" y="1310322"/>
+              <a:ext cx="179469" cy="290700"/>
+            </a:xfrm>
+            <a:prstGeom prst="rightBrace">
+              <a:avLst/>
+            </a:prstGeom>
+            <a:noFill/>
+            <a:ln w="19050">
+              <a:solidFill>
+                <a:srgbClr val="00B0F0"/>
+              </a:solidFill>
+            </a:ln>
+          </p:spPr>
+          <p:txBody>
+            <a:bodyPr wrap="square" rtlCol="0">
+              <a:spAutoFit/>
+            </a:bodyPr>
+            <a:lstStyle/>
+            <a:p>
+              <a:pPr algn="ctr"/>
+              <a:endParaRPr lang="en-US" sz="1100"/>
+            </a:p>
+          </p:txBody>
+        </p:sp>
+        <p:sp>
+          <p:nvSpPr>
+            <p:cNvPr id="17" name="TextBox 16">
+              <a:extLst>
+                <a:ext uri="{FF2B5EF4-FFF2-40B4-BE49-F238E27FC236}">
+                  <a16:creationId xmlns:a16="http://schemas.microsoft.com/office/drawing/2014/main" id="{576311C7-85F7-4A6A-B315-BA8E8B49ACD2}"/>
+                </a:ext>
+              </a:extLst>
+            </p:cNvPr>
+            <p:cNvSpPr txBox="1"/>
+            <p:nvPr/>
+          </p:nvSpPr>
+          <p:spPr>
+            <a:xfrm>
+              <a:off x="8712711" y="1325048"/>
+              <a:ext cx="1816772" cy="261610"/>
+            </a:xfrm>
+            <a:prstGeom prst="rect">
+              <a:avLst/>
+            </a:prstGeom>
             <a:solidFill>
-              <a:srgbClr val="FFE699"/>
+              <a:schemeClr val="bg1"/>
             </a:solidFill>
-          </a:ln>
-        </p:spPr>
-        <p:txBody>
-          <a:bodyPr wrap="square" rtlCol="0">
-            <a:spAutoFit/>
-          </a:bodyPr>
-          <a:lstStyle/>
-          <a:p>
-            <a:pPr algn="ctr"/>
-            <a:endParaRPr lang="en-US" sz="1100"/>
-          </a:p>
-        </p:txBody>
-      </p:sp>
-      <p:cxnSp>
-        <p:nvCxnSpPr>
-          <p:cNvPr id="62" name="Straight Arrow Connector 61">
-            <a:extLst>
-              <a:ext uri="{FF2B5EF4-FFF2-40B4-BE49-F238E27FC236}">
-                <a16:creationId xmlns:a16="http://schemas.microsoft.com/office/drawing/2014/main" id="{DE21824B-A998-4109-B4CA-9E7F78B82F25}"/>
-              </a:ext>
-            </a:extLst>
-          </p:cNvPr>
-          <p:cNvCxnSpPr>
-            <a:cxnSpLocks/>
-          </p:cNvCxnSpPr>
-          <p:nvPr/>
-        </p:nvCxnSpPr>
-        <p:spPr>
-          <a:xfrm rot="16200000" flipH="1">
-            <a:off x="7406814" y="4237893"/>
-            <a:ext cx="360724" cy="323273"/>
-          </a:xfrm>
-          <a:prstGeom prst="bentConnector3">
-            <a:avLst>
-              <a:gd name="adj1" fmla="val 3910"/>
-            </a:avLst>
-          </a:prstGeom>
-          <a:ln>
-            <a:tailEnd type="triangle"/>
-          </a:ln>
-        </p:spPr>
-        <p:style>
-          <a:lnRef idx="1">
-            <a:schemeClr val="accent1"/>
-          </a:lnRef>
-          <a:fillRef idx="0">
-            <a:schemeClr val="accent1"/>
-          </a:fillRef>
-          <a:effectRef idx="0">
-            <a:schemeClr val="accent1"/>
-          </a:effectRef>
-          <a:fontRef idx="minor">
-            <a:schemeClr val="tx1"/>
-          </a:fontRef>
-        </p:style>
-      </p:cxnSp>
-      <p:sp>
-        <p:nvSpPr>
-          <p:cNvPr id="33" name="Rectangle 32">
-            <a:extLst>
-              <a:ext uri="{FF2B5EF4-FFF2-40B4-BE49-F238E27FC236}">
-                <a16:creationId xmlns:a16="http://schemas.microsoft.com/office/drawing/2014/main" id="{056C2E5A-E260-480E-80EF-8C7DD990DBC8}"/>
-              </a:ext>
-            </a:extLst>
-          </p:cNvPr>
-          <p:cNvSpPr/>
-          <p:nvPr/>
-        </p:nvSpPr>
-        <p:spPr>
-          <a:xfrm rot="16200000">
-            <a:off x="-578959" y="3625398"/>
-            <a:ext cx="4737839" cy="289141"/>
-          </a:xfrm>
-          <a:prstGeom prst="rect">
-            <a:avLst/>
-          </a:prstGeom>
-          <a:solidFill>
-            <a:schemeClr val="accent6"/>
-          </a:solidFill>
-        </p:spPr>
-        <p:style>
-          <a:lnRef idx="2">
-            <a:schemeClr val="accent1">
-              <a:shade val="50000"/>
-            </a:schemeClr>
-          </a:lnRef>
-          <a:fillRef idx="1">
-            <a:schemeClr val="accent1"/>
-          </a:fillRef>
-          <a:effectRef idx="0">
-            <a:schemeClr val="accent1"/>
-          </a:effectRef>
-          <a:fontRef idx="minor">
-            <a:schemeClr val="lt1"/>
-          </a:fontRef>
-        </p:style>
-        <p:txBody>
-          <a:bodyPr rtlCol="0" anchor="ctr"/>
-          <a:lstStyle/>
-          <a:p>
-            <a:pPr algn="ctr"/>
-            <a:r>
-              <a:rPr lang="en-US" sz="1400" dirty="0">
-                <a:solidFill>
-                  <a:schemeClr val="bg1"/>
-                </a:solidFill>
-              </a:rPr>
-              <a:t>ISO/IEC JWG7 Safety, Effectiveness &amp; Security Standards</a:t>
-            </a:r>
-          </a:p>
-        </p:txBody>
-      </p:sp>
-      <p:sp>
-        <p:nvSpPr>
-          <p:cNvPr id="34" name="Rectangle 33">
-            <a:extLst>
-              <a:ext uri="{FF2B5EF4-FFF2-40B4-BE49-F238E27FC236}">
-                <a16:creationId xmlns:a16="http://schemas.microsoft.com/office/drawing/2014/main" id="{048D95D5-9744-4EBA-B9CA-C1C88BEF2ACD}"/>
-              </a:ext>
-            </a:extLst>
-          </p:cNvPr>
-          <p:cNvSpPr/>
-          <p:nvPr/>
-        </p:nvSpPr>
-        <p:spPr>
-          <a:xfrm rot="16200000">
-            <a:off x="-216309" y="3622262"/>
-            <a:ext cx="4731563" cy="289141"/>
-          </a:xfrm>
-          <a:prstGeom prst="rect">
-            <a:avLst/>
-          </a:prstGeom>
-          <a:solidFill>
-            <a:srgbClr val="7030A0"/>
-          </a:solidFill>
-        </p:spPr>
-        <p:style>
-          <a:lnRef idx="2">
-            <a:schemeClr val="accent1">
-              <a:shade val="50000"/>
-            </a:schemeClr>
-          </a:lnRef>
-          <a:fillRef idx="1">
-            <a:schemeClr val="accent1"/>
-          </a:fillRef>
-          <a:effectRef idx="0">
-            <a:schemeClr val="accent1"/>
-          </a:effectRef>
-          <a:fontRef idx="minor">
-            <a:schemeClr val="lt1"/>
-          </a:fontRef>
-        </p:style>
-        <p:txBody>
-          <a:bodyPr rtlCol="0" anchor="ctr"/>
-          <a:lstStyle/>
-          <a:p>
-            <a:pPr algn="ctr"/>
-            <a:r>
-              <a:rPr lang="en-US" sz="1400" dirty="0">
-                <a:solidFill>
-                  <a:schemeClr val="bg1"/>
-                </a:solidFill>
-              </a:rPr>
-              <a:t>ISO/IEEE 11073-1010x Nomenclature &amp; 11073-10201 DIM</a:t>
-            </a:r>
-          </a:p>
-        </p:txBody>
-      </p:sp>
-      <p:sp>
-        <p:nvSpPr>
-          <p:cNvPr id="3" name="TextBox 2">
-            <a:extLst>
-              <a:ext uri="{FF2B5EF4-FFF2-40B4-BE49-F238E27FC236}">
-                <a16:creationId xmlns:a16="http://schemas.microsoft.com/office/drawing/2014/main" id="{50D06CED-D061-F043-AAD7-A17A38F98956}"/>
-              </a:ext>
-            </a:extLst>
-          </p:cNvPr>
-          <p:cNvSpPr txBox="1"/>
-          <p:nvPr/>
-        </p:nvSpPr>
-        <p:spPr>
-          <a:xfrm>
-            <a:off x="8724812" y="4705287"/>
-            <a:ext cx="1547597" cy="261613"/>
-          </a:xfrm>
-          <a:prstGeom prst="rect">
-            <a:avLst/>
-          </a:prstGeom>
-          <a:noFill/>
-          <a:ln>
-            <a:solidFill>
-              <a:srgbClr val="4472C4"/>
-            </a:solidFill>
-          </a:ln>
-        </p:spPr>
-        <p:txBody>
-          <a:bodyPr wrap="square" rtlCol="0">
-            <a:spAutoFit/>
-          </a:bodyPr>
-          <a:lstStyle/>
-          <a:p>
-            <a:pPr algn="ctr"/>
-            <a:r>
-              <a:rPr lang="en-US" sz="1100" dirty="0"/>
-              <a:t>Core Standards</a:t>
-            </a:r>
-          </a:p>
-        </p:txBody>
-      </p:sp>
-      <p:sp>
-        <p:nvSpPr>
-          <p:cNvPr id="43" name="Right Brace 42">
-            <a:extLst>
-              <a:ext uri="{FF2B5EF4-FFF2-40B4-BE49-F238E27FC236}">
-                <a16:creationId xmlns:a16="http://schemas.microsoft.com/office/drawing/2014/main" id="{89C79962-86CD-4F25-9B07-97FBEC574F44}"/>
-              </a:ext>
-            </a:extLst>
-          </p:cNvPr>
-          <p:cNvSpPr/>
-          <p:nvPr/>
-        </p:nvSpPr>
-        <p:spPr>
-          <a:xfrm>
-            <a:off x="8576097" y="3613455"/>
-            <a:ext cx="143700" cy="2452196"/>
-          </a:xfrm>
-          <a:prstGeom prst="rightBrace">
-            <a:avLst/>
-          </a:prstGeom>
-          <a:noFill/>
-          <a:ln w="19050">
-            <a:solidFill>
-              <a:srgbClr val="4472C4"/>
-            </a:solidFill>
-          </a:ln>
-        </p:spPr>
-        <p:txBody>
-          <a:bodyPr wrap="square" rtlCol="0">
-            <a:spAutoFit/>
-          </a:bodyPr>
-          <a:lstStyle/>
-          <a:p>
-            <a:pPr algn="ctr"/>
-            <a:endParaRPr lang="en-US" sz="1100"/>
-          </a:p>
-        </p:txBody>
-      </p:sp>
-      <p:sp>
-        <p:nvSpPr>
-          <p:cNvPr id="44" name="Rectangle 43">
-            <a:extLst>
-              <a:ext uri="{FF2B5EF4-FFF2-40B4-BE49-F238E27FC236}">
-                <a16:creationId xmlns:a16="http://schemas.microsoft.com/office/drawing/2014/main" id="{28C0BAB7-88D4-4E5A-B05E-0F8EB344A53F}"/>
-              </a:ext>
-            </a:extLst>
-          </p:cNvPr>
-          <p:cNvSpPr/>
-          <p:nvPr/>
-        </p:nvSpPr>
-        <p:spPr>
-          <a:xfrm>
-            <a:off x="2381419" y="1805225"/>
-            <a:ext cx="6197649" cy="1721156"/>
-          </a:xfrm>
-          <a:prstGeom prst="rect">
-            <a:avLst/>
-          </a:prstGeom>
-          <a:noFill/>
-          <a:ln>
-            <a:solidFill>
-              <a:srgbClr val="00B0F0"/>
-            </a:solidFill>
-            <a:prstDash val="dash"/>
-          </a:ln>
-        </p:spPr>
-        <p:style>
-          <a:lnRef idx="2">
-            <a:schemeClr val="accent1">
-              <a:shade val="50000"/>
-            </a:schemeClr>
-          </a:lnRef>
-          <a:fillRef idx="1">
-            <a:schemeClr val="accent1"/>
-          </a:fillRef>
-          <a:effectRef idx="0">
-            <a:schemeClr val="accent1"/>
-          </a:effectRef>
-          <a:fontRef idx="minor">
-            <a:schemeClr val="lt1"/>
-          </a:fontRef>
-        </p:style>
-        <p:txBody>
-          <a:bodyPr rtlCol="0" anchor="ctr"/>
-          <a:lstStyle/>
-          <a:p>
-            <a:pPr algn="ctr"/>
-            <a:endParaRPr lang="en-US" sz="1200" dirty="0">
+            <a:ln>
               <a:solidFill>
-                <a:schemeClr val="tx1"/>
+                <a:srgbClr val="00B0F0"/>
               </a:solidFill>
-            </a:endParaRPr>
-          </a:p>
-        </p:txBody>
-      </p:sp>
-      <p:sp>
-        <p:nvSpPr>
-          <p:cNvPr id="49" name="TextBox 48">
-            <a:extLst>
-              <a:ext uri="{FF2B5EF4-FFF2-40B4-BE49-F238E27FC236}">
-                <a16:creationId xmlns:a16="http://schemas.microsoft.com/office/drawing/2014/main" id="{6EAC5B87-61CC-4D96-9190-A6D180D7D8C8}"/>
-              </a:ext>
-            </a:extLst>
-          </p:cNvPr>
-          <p:cNvSpPr txBox="1"/>
-          <p:nvPr/>
-        </p:nvSpPr>
-        <p:spPr>
-          <a:xfrm rot="16200000">
-            <a:off x="1291681" y="2071777"/>
-            <a:ext cx="2539874" cy="369332"/>
-          </a:xfrm>
-          <a:prstGeom prst="rect">
-            <a:avLst/>
-          </a:prstGeom>
-          <a:noFill/>
-        </p:spPr>
-        <p:txBody>
-          <a:bodyPr wrap="square" rtlCol="0">
-            <a:spAutoFit/>
-          </a:bodyPr>
-          <a:lstStyle/>
-          <a:p>
-            <a:r>
-              <a:rPr lang="en-US" b="1" dirty="0">
-                <a:solidFill>
-                  <a:srgbClr val="0070C0"/>
-                </a:solidFill>
-              </a:rPr>
-              <a:t>Gemini SES MDI</a:t>
-            </a:r>
-          </a:p>
-        </p:txBody>
-      </p:sp>
-      <p:sp>
-        <p:nvSpPr>
-          <p:cNvPr id="13" name="Right Brace 12">
-            <a:extLst>
-              <a:ext uri="{FF2B5EF4-FFF2-40B4-BE49-F238E27FC236}">
-                <a16:creationId xmlns:a16="http://schemas.microsoft.com/office/drawing/2014/main" id="{041B15BD-0B4A-4012-880D-80046F3FE3E3}"/>
-              </a:ext>
-            </a:extLst>
-          </p:cNvPr>
-          <p:cNvSpPr/>
-          <p:nvPr/>
-        </p:nvSpPr>
-        <p:spPr>
-          <a:xfrm>
-            <a:off x="8593592" y="3041079"/>
-            <a:ext cx="143699" cy="400666"/>
-          </a:xfrm>
-          <a:prstGeom prst="rightBrace">
-            <a:avLst/>
-          </a:prstGeom>
-          <a:noFill/>
-          <a:ln w="19050">
-            <a:solidFill>
-              <a:srgbClr val="9DC3E6"/>
-            </a:solidFill>
-          </a:ln>
-        </p:spPr>
-        <p:txBody>
-          <a:bodyPr wrap="square" rtlCol="0">
-            <a:spAutoFit/>
-          </a:bodyPr>
-          <a:lstStyle/>
-          <a:p>
-            <a:pPr algn="ctr"/>
-            <a:endParaRPr lang="en-US" sz="1100"/>
-          </a:p>
-        </p:txBody>
-      </p:sp>
-      <p:sp>
-        <p:nvSpPr>
-          <p:cNvPr id="10" name="TextBox 9">
-            <a:extLst>
-              <a:ext uri="{FF2B5EF4-FFF2-40B4-BE49-F238E27FC236}">
-                <a16:creationId xmlns:a16="http://schemas.microsoft.com/office/drawing/2014/main" id="{EC5E3442-9322-43B7-92C8-469A6B8A0E82}"/>
-              </a:ext>
-            </a:extLst>
-          </p:cNvPr>
-          <p:cNvSpPr txBox="1"/>
-          <p:nvPr/>
-        </p:nvSpPr>
-        <p:spPr>
-          <a:xfrm>
-            <a:off x="8719795" y="3041079"/>
-            <a:ext cx="1821791" cy="430887"/>
-          </a:xfrm>
-          <a:prstGeom prst="rect">
-            <a:avLst/>
-          </a:prstGeom>
-          <a:solidFill>
-            <a:schemeClr val="bg1"/>
-          </a:solidFill>
-          <a:ln>
-            <a:solidFill>
-              <a:srgbClr val="9DC3E6"/>
-            </a:solidFill>
-          </a:ln>
-        </p:spPr>
-        <p:txBody>
-          <a:bodyPr wrap="square" rtlCol="0">
-            <a:spAutoFit/>
-          </a:bodyPr>
-          <a:lstStyle/>
-          <a:p>
-            <a:pPr algn="ctr"/>
-            <a:r>
-              <a:rPr lang="en-US" sz="1100" dirty="0"/>
-              <a:t>Stakeholder Community Implementation Agreements</a:t>
-            </a:r>
-          </a:p>
-        </p:txBody>
-      </p:sp>
-      <p:sp>
-        <p:nvSpPr>
-          <p:cNvPr id="31" name="TextBox 30">
-            <a:extLst>
-              <a:ext uri="{FF2B5EF4-FFF2-40B4-BE49-F238E27FC236}">
-                <a16:creationId xmlns:a16="http://schemas.microsoft.com/office/drawing/2014/main" id="{AD50D505-74C7-6A4E-AA79-3DDA0EBD1BA4}"/>
-              </a:ext>
-            </a:extLst>
-          </p:cNvPr>
-          <p:cNvSpPr txBox="1"/>
-          <p:nvPr/>
-        </p:nvSpPr>
-        <p:spPr>
-          <a:xfrm>
-            <a:off x="8719795" y="2543643"/>
-            <a:ext cx="1821790" cy="430887"/>
-          </a:xfrm>
-          <a:prstGeom prst="rect">
-            <a:avLst/>
-          </a:prstGeom>
-          <a:solidFill>
-            <a:schemeClr val="bg1"/>
-          </a:solidFill>
-          <a:ln>
-            <a:solidFill>
-              <a:srgbClr val="70AD47"/>
-            </a:solidFill>
-          </a:ln>
-        </p:spPr>
-        <p:txBody>
-          <a:bodyPr wrap="square" rtlCol="0">
-            <a:spAutoFit/>
-          </a:bodyPr>
-          <a:lstStyle/>
-          <a:p>
-            <a:pPr algn="ctr"/>
-            <a:r>
-              <a:rPr lang="en-US" sz="1100" dirty="0"/>
-              <a:t>Safe, Effective &amp; Secure Interoperability</a:t>
-            </a:r>
-          </a:p>
-        </p:txBody>
-      </p:sp>
-      <p:sp>
-        <p:nvSpPr>
-          <p:cNvPr id="15" name="TextBox 14">
-            <a:extLst>
-              <a:ext uri="{FF2B5EF4-FFF2-40B4-BE49-F238E27FC236}">
-                <a16:creationId xmlns:a16="http://schemas.microsoft.com/office/drawing/2014/main" id="{F614D6B2-558D-4702-80EA-A17715646E96}"/>
-              </a:ext>
-            </a:extLst>
-          </p:cNvPr>
-          <p:cNvSpPr txBox="1"/>
-          <p:nvPr/>
-        </p:nvSpPr>
-        <p:spPr>
-          <a:xfrm>
-            <a:off x="8717417" y="1691975"/>
-            <a:ext cx="1816772" cy="261610"/>
-          </a:xfrm>
-          <a:prstGeom prst="rect">
-            <a:avLst/>
-          </a:prstGeom>
-          <a:solidFill>
-            <a:schemeClr val="bg1"/>
-          </a:solidFill>
-          <a:ln>
-            <a:solidFill>
-              <a:srgbClr val="F8CBAD"/>
-            </a:solidFill>
-          </a:ln>
-        </p:spPr>
-        <p:txBody>
-          <a:bodyPr wrap="square" rtlCol="0">
-            <a:spAutoFit/>
-          </a:bodyPr>
-          <a:lstStyle/>
-          <a:p>
-            <a:pPr algn="ctr"/>
-            <a:r>
-              <a:rPr lang="en-US" sz="1100" dirty="0"/>
-              <a:t>SOA, MDIRA/ICE, …</a:t>
-            </a:r>
-          </a:p>
-        </p:txBody>
-      </p:sp>
-      <p:sp>
-        <p:nvSpPr>
-          <p:cNvPr id="16" name="Right Brace 15">
-            <a:extLst>
-              <a:ext uri="{FF2B5EF4-FFF2-40B4-BE49-F238E27FC236}">
-                <a16:creationId xmlns:a16="http://schemas.microsoft.com/office/drawing/2014/main" id="{98057135-CDB9-46E4-B44E-4BB536E2A161}"/>
-              </a:ext>
-            </a:extLst>
-          </p:cNvPr>
-          <p:cNvSpPr/>
-          <p:nvPr/>
-        </p:nvSpPr>
-        <p:spPr>
-          <a:xfrm>
-            <a:off x="8593591" y="1707061"/>
-            <a:ext cx="109099" cy="246523"/>
-          </a:xfrm>
-          <a:prstGeom prst="rightBrace">
-            <a:avLst>
-              <a:gd name="adj1" fmla="val 8333"/>
-              <a:gd name="adj2" fmla="val 51821"/>
-            </a:avLst>
-          </a:prstGeom>
-          <a:noFill/>
-          <a:ln w="19050">
-            <a:solidFill>
-              <a:srgbClr val="F8CBAD"/>
-            </a:solidFill>
-          </a:ln>
-        </p:spPr>
-        <p:txBody>
-          <a:bodyPr wrap="square" rtlCol="0">
-            <a:spAutoFit/>
-          </a:bodyPr>
-          <a:lstStyle/>
-          <a:p>
-            <a:pPr algn="ctr"/>
-            <a:endParaRPr lang="en-US" sz="1100"/>
-          </a:p>
-        </p:txBody>
-      </p:sp>
-      <p:sp>
-        <p:nvSpPr>
-          <p:cNvPr id="18" name="Right Brace 17">
-            <a:extLst>
-              <a:ext uri="{FF2B5EF4-FFF2-40B4-BE49-F238E27FC236}">
-                <a16:creationId xmlns:a16="http://schemas.microsoft.com/office/drawing/2014/main" id="{46F43B94-BBD8-4D2F-AE2D-D4A7459E3E86}"/>
-              </a:ext>
-            </a:extLst>
-          </p:cNvPr>
-          <p:cNvSpPr/>
-          <p:nvPr/>
-        </p:nvSpPr>
-        <p:spPr>
-          <a:xfrm>
-            <a:off x="8533242" y="1310322"/>
-            <a:ext cx="179469" cy="290700"/>
-          </a:xfrm>
-          <a:prstGeom prst="rightBrace">
-            <a:avLst/>
-          </a:prstGeom>
-          <a:noFill/>
-          <a:ln w="19050">
-            <a:solidFill>
-              <a:srgbClr val="00B0F0"/>
-            </a:solidFill>
-          </a:ln>
-        </p:spPr>
-        <p:txBody>
-          <a:bodyPr wrap="square" rtlCol="0">
-            <a:spAutoFit/>
-          </a:bodyPr>
-          <a:lstStyle/>
-          <a:p>
-            <a:pPr algn="ctr"/>
-            <a:endParaRPr lang="en-US" sz="1100"/>
-          </a:p>
-        </p:txBody>
-      </p:sp>
-      <p:sp>
-        <p:nvSpPr>
-          <p:cNvPr id="17" name="TextBox 16">
-            <a:extLst>
-              <a:ext uri="{FF2B5EF4-FFF2-40B4-BE49-F238E27FC236}">
-                <a16:creationId xmlns:a16="http://schemas.microsoft.com/office/drawing/2014/main" id="{576311C7-85F7-4A6A-B315-BA8E8B49ACD2}"/>
-              </a:ext>
-            </a:extLst>
-          </p:cNvPr>
-          <p:cNvSpPr txBox="1"/>
-          <p:nvPr/>
-        </p:nvSpPr>
-        <p:spPr>
-          <a:xfrm>
-            <a:off x="8712711" y="1325048"/>
-            <a:ext cx="1816772" cy="261610"/>
-          </a:xfrm>
-          <a:prstGeom prst="rect">
-            <a:avLst/>
-          </a:prstGeom>
-          <a:solidFill>
-            <a:schemeClr val="bg1"/>
-          </a:solidFill>
-          <a:ln>
-            <a:solidFill>
-              <a:srgbClr val="00B0F0"/>
-            </a:solidFill>
-          </a:ln>
-        </p:spPr>
-        <p:txBody>
-          <a:bodyPr wrap="square" rtlCol="0">
-            <a:spAutoFit/>
-          </a:bodyPr>
-          <a:lstStyle/>
-          <a:p>
-            <a:pPr algn="ctr"/>
-            <a:r>
-              <a:rPr lang="en-US" sz="1100" dirty="0"/>
-              <a:t>Real-world Needs</a:t>
-            </a:r>
-          </a:p>
-        </p:txBody>
-      </p:sp>
+            </a:ln>
+          </p:spPr>
+          <p:txBody>
+            <a:bodyPr wrap="square" rtlCol="0">
+              <a:spAutoFit/>
+            </a:bodyPr>
+            <a:lstStyle/>
+            <a:p>
+              <a:pPr algn="ctr"/>
+              <a:r>
+                <a:rPr lang="en-US" sz="1100" dirty="0"/>
+                <a:t>Real-world Needs</a:t>
+              </a:r>
+            </a:p>
+          </p:txBody>
+        </p:sp>
+      </p:grpSp>
     </p:spTree>
     <p:extLst>
       <p:ext uri="{BB962C8B-B14F-4D97-AF65-F5344CB8AC3E}">

</xml_diff>